<commit_message>
* add a mid-report as pdf format
</commit_message>
<xml_diff>
--- a/docs/HandEye Calibration Mid-Report.pptx
+++ b/docs/HandEye Calibration Mid-Report.pptx
@@ -3109,7 +3109,7 @@
         <p:spPr>
           <a:xfrm>
             <a:off x="107504" y="188640"/>
-            <a:ext cx="4172937" cy="369332"/>
+            <a:ext cx="4147289" cy="369332"/>
           </a:xfrm>
           <a:prstGeom prst="rect">
             <a:avLst/>
@@ -3127,8 +3127,20 @@
               <a:t>#1 </a:t>
             </a:r>
             <a:r>
+              <a:rPr lang="en-US" altLang="ko-KR" dirty="0" smtClean="0"/>
+              <a:t>SVD</a:t>
+            </a:r>
+            <a:r>
               <a:rPr lang="ko-KR" altLang="en-US" dirty="0" smtClean="0"/>
-              <a:t>다중 샘플을 이용한 변환 매트릭스 </a:t>
+              <a:t>를 </a:t>
+            </a:r>
+            <a:r>
+              <a:rPr lang="ko-KR" altLang="en-US" dirty="0" smtClean="0"/>
+              <a:t>이용한 변환 매트릭스 </a:t>
+            </a:r>
+            <a:r>
+              <a:rPr lang="ko-KR" altLang="en-US" dirty="0" smtClean="0"/>
+              <a:t> 획득</a:t>
             </a:r>
             <a:endParaRPr lang="ko-KR" altLang="en-US" dirty="0"/>
           </a:p>
@@ -3525,7 +3537,7 @@
         <p:spPr>
           <a:xfrm>
             <a:off x="107504" y="188640"/>
-            <a:ext cx="4172937" cy="369332"/>
+            <a:ext cx="4286751" cy="369332"/>
           </a:xfrm>
           <a:prstGeom prst="rect">
             <a:avLst/>
@@ -3543,8 +3555,12 @@
               <a:t>#1 </a:t>
             </a:r>
             <a:r>
-              <a:rPr lang="ko-KR" altLang="en-US" dirty="0" smtClean="0"/>
-              <a:t>다중 샘플을 이용한 변환 매트릭스 </a:t>
+              <a:rPr lang="en-US" altLang="ko-KR" dirty="0" smtClean="0"/>
+              <a:t>SVD</a:t>
+            </a:r>
+            <a:r>
+              <a:rPr lang="ko-KR" altLang="en-US" dirty="0"/>
+              <a:t>를 이용한 변환 매트릭스  획득</a:t>
             </a:r>
             <a:endParaRPr lang="ko-KR" altLang="en-US" dirty="0"/>
           </a:p>
@@ -5464,8 +5480,8 @@
           </a:fontRef>
         </p:style>
       </p:cxnSp>
-      <mc:AlternateContent xmlns:mc="http://schemas.openxmlformats.org/markup-compatibility/2006">
-        <mc:Choice xmlns:a14="http://schemas.microsoft.com/office/drawing/2010/main" Requires="a14">
+      <mc:AlternateContent xmlns:mc="http://schemas.openxmlformats.org/markup-compatibility/2006" xmlns:a14="http://schemas.microsoft.com/office/drawing/2010/main">
+        <mc:Choice Requires="a14">
           <p:sp>
             <p:nvSpPr>
               <p:cNvPr id="28" name="직사각형 27"/>
@@ -5487,6 +5503,7 @@
               </a:bodyPr>
               <a:lstStyle/>
               <a:p>
+                <a:pPr/>
                 <a14:m>
                   <m:oMathPara xmlns:m="http://schemas.openxmlformats.org/officeDocument/2006/math">
                     <m:oMathParaPr>
@@ -5496,24 +5513,32 @@
                       <m:sSubSup>
                         <m:sSubSupPr>
                           <m:ctrlPr>
-                            <a:rPr lang="ko-KR" altLang="ko-KR" i="1"/>
+                            <a:rPr lang="ko-KR" altLang="ko-KR" i="1">
+                              <a:latin typeface="Cambria Math"/>
+                            </a:rPr>
                           </m:ctrlPr>
                         </m:sSubSupPr>
                         <m:e>
                           <m:r>
-                            <a:rPr lang="en-US" altLang="ko-KR" i="1"/>
+                            <a:rPr lang="en-US" altLang="ko-KR" i="1">
+                              <a:latin typeface="Cambria Math"/>
+                            </a:rPr>
                             <m:t>𝐻</m:t>
                           </m:r>
                         </m:e>
                         <m:sub>
                           <m:r>
-                            <a:rPr lang="en-US" altLang="ko-KR" i="1"/>
+                            <a:rPr lang="en-US" altLang="ko-KR" i="1">
+                              <a:latin typeface="Cambria Math"/>
+                            </a:rPr>
                             <m:t>𝑇𝐶𝑃</m:t>
                           </m:r>
                         </m:sub>
                         <m:sup>
                           <m:r>
-                            <a:rPr lang="en-US" altLang="ko-KR" i="1"/>
+                            <a:rPr lang="en-US" altLang="ko-KR" i="1">
+                              <a:latin typeface="Cambria Math"/>
+                            </a:rPr>
                             <m:t>𝐶𝐴𝐿</m:t>
                           </m:r>
                         </m:sup>
@@ -5526,7 +5551,7 @@
             </p:txBody>
           </p:sp>
         </mc:Choice>
-        <mc:Fallback>
+        <mc:Fallback xmlns="">
           <p:sp>
             <p:nvSpPr>
               <p:cNvPr id="28" name="직사각형 27"/>
@@ -5605,8 +5630,8 @@
           </a:fontRef>
         </p:style>
       </p:cxnSp>
-      <mc:AlternateContent xmlns:mc="http://schemas.openxmlformats.org/markup-compatibility/2006">
-        <mc:Choice xmlns:a14="http://schemas.microsoft.com/office/drawing/2010/main" Requires="a14">
+      <mc:AlternateContent xmlns:mc="http://schemas.openxmlformats.org/markup-compatibility/2006" xmlns:a14="http://schemas.microsoft.com/office/drawing/2010/main">
+        <mc:Choice Requires="a14">
           <p:sp>
             <p:nvSpPr>
               <p:cNvPr id="6147" name="직사각형 6146"/>
@@ -5628,6 +5653,7 @@
               </a:bodyPr>
               <a:lstStyle/>
               <a:p>
+                <a:pPr/>
                 <a14:m>
                   <m:oMathPara xmlns:m="http://schemas.openxmlformats.org/officeDocument/2006/math">
                     <m:oMathParaPr>
@@ -5637,24 +5663,32 @@
                       <m:sSubSup>
                         <m:sSubSupPr>
                           <m:ctrlPr>
-                            <a:rPr lang="ko-KR" altLang="ko-KR" i="1"/>
+                            <a:rPr lang="ko-KR" altLang="ko-KR" i="1">
+                              <a:latin typeface="Cambria Math"/>
+                            </a:rPr>
                           </m:ctrlPr>
                         </m:sSubSupPr>
                         <m:e>
                           <m:r>
-                            <a:rPr lang="en-US" altLang="ko-KR" i="1"/>
+                            <a:rPr lang="en-US" altLang="ko-KR" i="1">
+                              <a:latin typeface="Cambria Math"/>
+                            </a:rPr>
                             <m:t>𝐻</m:t>
                           </m:r>
                         </m:e>
                         <m:sub>
                           <m:r>
-                            <a:rPr lang="en-US" altLang="ko-KR" i="1"/>
+                            <a:rPr lang="en-US" altLang="ko-KR" i="1">
+                              <a:latin typeface="Cambria Math"/>
+                            </a:rPr>
                             <m:t>𝐵𝐴𝑆𝐸</m:t>
                           </m:r>
                         </m:sub>
                         <m:sup>
                           <m:r>
-                            <a:rPr lang="en-US" altLang="ko-KR" i="1"/>
+                            <a:rPr lang="en-US" altLang="ko-KR" i="1">
+                              <a:latin typeface="Cambria Math"/>
+                            </a:rPr>
                             <m:t>𝑇𝐶𝑃</m:t>
                           </m:r>
                         </m:sup>
@@ -5667,7 +5701,7 @@
             </p:txBody>
           </p:sp>
         </mc:Choice>
-        <mc:Fallback>
+        <mc:Fallback xmlns="">
           <p:sp>
             <p:nvSpPr>
               <p:cNvPr id="6147" name="직사각형 6146"/>
@@ -5746,8 +5780,8 @@
           </a:fontRef>
         </p:style>
       </p:cxnSp>
-      <mc:AlternateContent xmlns:mc="http://schemas.openxmlformats.org/markup-compatibility/2006">
-        <mc:Choice xmlns:a14="http://schemas.microsoft.com/office/drawing/2010/main" Requires="a14">
+      <mc:AlternateContent xmlns:mc="http://schemas.openxmlformats.org/markup-compatibility/2006" xmlns:a14="http://schemas.microsoft.com/office/drawing/2010/main">
+        <mc:Choice Requires="a14">
           <p:sp>
             <p:nvSpPr>
               <p:cNvPr id="40" name="직사각형 39"/>
@@ -5769,6 +5803,7 @@
               </a:bodyPr>
               <a:lstStyle/>
               <a:p>
+                <a:pPr/>
                 <a14:m>
                   <m:oMathPara xmlns:m="http://schemas.openxmlformats.org/officeDocument/2006/math">
                     <m:oMathParaPr>
@@ -5778,12 +5813,16 @@
                       <m:sSubSup>
                         <m:sSubSupPr>
                           <m:ctrlPr>
-                            <a:rPr lang="ko-KR" altLang="ko-KR" i="1" smtClean="0"/>
+                            <a:rPr lang="ko-KR" altLang="ko-KR" i="1" smtClean="0">
+                              <a:latin typeface="Cambria Math"/>
+                            </a:rPr>
                           </m:ctrlPr>
                         </m:sSubSupPr>
                         <m:e>
                           <m:r>
-                            <a:rPr lang="en-US" altLang="ko-KR" i="1"/>
+                            <a:rPr lang="en-US" altLang="ko-KR" i="1">
+                              <a:latin typeface="Cambria Math"/>
+                            </a:rPr>
                             <m:t>𝐻</m:t>
                           </m:r>
                         </m:e>
@@ -5812,7 +5851,7 @@
             </p:txBody>
           </p:sp>
         </mc:Choice>
-        <mc:Fallback>
+        <mc:Fallback xmlns="">
           <p:sp>
             <p:nvSpPr>
               <p:cNvPr id="40" name="직사각형 39"/>
@@ -5889,8 +5928,8 @@
           </a:fontRef>
         </p:style>
       </p:cxnSp>
-      <mc:AlternateContent xmlns:mc="http://schemas.openxmlformats.org/markup-compatibility/2006">
-        <mc:Choice xmlns:a14="http://schemas.microsoft.com/office/drawing/2010/main" Requires="a14">
+      <mc:AlternateContent xmlns:mc="http://schemas.openxmlformats.org/markup-compatibility/2006" xmlns:a14="http://schemas.microsoft.com/office/drawing/2010/main">
+        <mc:Choice Requires="a14">
           <p:sp>
             <p:nvSpPr>
               <p:cNvPr id="54" name="직사각형 53"/>
@@ -5912,6 +5951,7 @@
               </a:bodyPr>
               <a:lstStyle/>
               <a:p>
+                <a:pPr/>
                 <a14:m>
                   <m:oMathPara xmlns:m="http://schemas.openxmlformats.org/officeDocument/2006/math">
                     <m:oMathParaPr>
@@ -5921,12 +5961,16 @@
                       <m:sSubSup>
                         <m:sSubSupPr>
                           <m:ctrlPr>
-                            <a:rPr lang="ko-KR" altLang="ko-KR" i="1" smtClean="0"/>
+                            <a:rPr lang="ko-KR" altLang="ko-KR" i="1" smtClean="0">
+                              <a:latin typeface="Cambria Math"/>
+                            </a:rPr>
                           </m:ctrlPr>
                         </m:sSubSupPr>
                         <m:e>
                           <m:r>
-                            <a:rPr lang="en-US" altLang="ko-KR" i="1"/>
+                            <a:rPr lang="en-US" altLang="ko-KR" i="1">
+                              <a:latin typeface="Cambria Math"/>
+                            </a:rPr>
                             <m:t>𝐻</m:t>
                           </m:r>
                         </m:e>
@@ -5955,7 +5999,7 @@
             </p:txBody>
           </p:sp>
         </mc:Choice>
-        <mc:Fallback>
+        <mc:Fallback xmlns="">
           <p:sp>
             <p:nvSpPr>
               <p:cNvPr id="54" name="직사각형 53"/>

</xml_diff>

<commit_message>
* arrange codes for some notification
</commit_message>
<xml_diff>
--- a/docs/HandEye Calibration Mid-Report.pptx
+++ b/docs/HandEye Calibration Mid-Report.pptx
@@ -5,12 +5,18 @@
     <p:sldMasterId id="2147483648" r:id="rId1"/>
   </p:sldMasterIdLst>
   <p:sldIdLst>
-    <p:sldId id="257" r:id="rId2"/>
-    <p:sldId id="259" r:id="rId3"/>
-    <p:sldId id="258" r:id="rId4"/>
-    <p:sldId id="261" r:id="rId5"/>
-    <p:sldId id="262" r:id="rId6"/>
-    <p:sldId id="260" r:id="rId7"/>
+    <p:sldId id="265" r:id="rId2"/>
+    <p:sldId id="257" r:id="rId3"/>
+    <p:sldId id="259" r:id="rId4"/>
+    <p:sldId id="258" r:id="rId5"/>
+    <p:sldId id="261" r:id="rId6"/>
+    <p:sldId id="262" r:id="rId7"/>
+    <p:sldId id="260" r:id="rId8"/>
+    <p:sldId id="263" r:id="rId9"/>
+    <p:sldId id="264" r:id="rId10"/>
+    <p:sldId id="266" r:id="rId11"/>
+    <p:sldId id="267" r:id="rId12"/>
+    <p:sldId id="268" r:id="rId13"/>
   </p:sldIdLst>
   <p:sldSz cx="9144000" cy="6858000" type="screen4x3"/>
   <p:notesSz cx="6858000" cy="9144000"/>
@@ -293,7 +299,7 @@
           <a:p>
             <a:fld id="{62CE4A98-B1CF-4092-8881-A1E910747080}" type="datetimeFigureOut">
               <a:rPr lang="ko-KR" altLang="en-US" smtClean="0"/>
-              <a:t>2020-06-03</a:t>
+              <a:t>2020-06-11</a:t>
             </a:fld>
             <a:endParaRPr lang="ko-KR" altLang="en-US"/>
           </a:p>
@@ -463,7 +469,7 @@
           <a:p>
             <a:fld id="{62CE4A98-B1CF-4092-8881-A1E910747080}" type="datetimeFigureOut">
               <a:rPr lang="ko-KR" altLang="en-US" smtClean="0"/>
-              <a:t>2020-06-03</a:t>
+              <a:t>2020-06-11</a:t>
             </a:fld>
             <a:endParaRPr lang="ko-KR" altLang="en-US"/>
           </a:p>
@@ -643,7 +649,7 @@
           <a:p>
             <a:fld id="{62CE4A98-B1CF-4092-8881-A1E910747080}" type="datetimeFigureOut">
               <a:rPr lang="ko-KR" altLang="en-US" smtClean="0"/>
-              <a:t>2020-06-03</a:t>
+              <a:t>2020-06-11</a:t>
             </a:fld>
             <a:endParaRPr lang="ko-KR" altLang="en-US"/>
           </a:p>
@@ -813,7 +819,7 @@
           <a:p>
             <a:fld id="{62CE4A98-B1CF-4092-8881-A1E910747080}" type="datetimeFigureOut">
               <a:rPr lang="ko-KR" altLang="en-US" smtClean="0"/>
-              <a:t>2020-06-03</a:t>
+              <a:t>2020-06-11</a:t>
             </a:fld>
             <a:endParaRPr lang="ko-KR" altLang="en-US"/>
           </a:p>
@@ -1059,7 +1065,7 @@
           <a:p>
             <a:fld id="{62CE4A98-B1CF-4092-8881-A1E910747080}" type="datetimeFigureOut">
               <a:rPr lang="ko-KR" altLang="en-US" smtClean="0"/>
-              <a:t>2020-06-03</a:t>
+              <a:t>2020-06-11</a:t>
             </a:fld>
             <a:endParaRPr lang="ko-KR" altLang="en-US"/>
           </a:p>
@@ -1347,7 +1353,7 @@
           <a:p>
             <a:fld id="{62CE4A98-B1CF-4092-8881-A1E910747080}" type="datetimeFigureOut">
               <a:rPr lang="ko-KR" altLang="en-US" smtClean="0"/>
-              <a:t>2020-06-03</a:t>
+              <a:t>2020-06-11</a:t>
             </a:fld>
             <a:endParaRPr lang="ko-KR" altLang="en-US"/>
           </a:p>
@@ -1769,7 +1775,7 @@
           <a:p>
             <a:fld id="{62CE4A98-B1CF-4092-8881-A1E910747080}" type="datetimeFigureOut">
               <a:rPr lang="ko-KR" altLang="en-US" smtClean="0"/>
-              <a:t>2020-06-03</a:t>
+              <a:t>2020-06-11</a:t>
             </a:fld>
             <a:endParaRPr lang="ko-KR" altLang="en-US"/>
           </a:p>
@@ -1887,7 +1893,7 @@
           <a:p>
             <a:fld id="{62CE4A98-B1CF-4092-8881-A1E910747080}" type="datetimeFigureOut">
               <a:rPr lang="ko-KR" altLang="en-US" smtClean="0"/>
-              <a:t>2020-06-03</a:t>
+              <a:t>2020-06-11</a:t>
             </a:fld>
             <a:endParaRPr lang="ko-KR" altLang="en-US"/>
           </a:p>
@@ -1982,7 +1988,7 @@
           <a:p>
             <a:fld id="{62CE4A98-B1CF-4092-8881-A1E910747080}" type="datetimeFigureOut">
               <a:rPr lang="ko-KR" altLang="en-US" smtClean="0"/>
-              <a:t>2020-06-03</a:t>
+              <a:t>2020-06-11</a:t>
             </a:fld>
             <a:endParaRPr lang="ko-KR" altLang="en-US"/>
           </a:p>
@@ -2259,7 +2265,7 @@
           <a:p>
             <a:fld id="{62CE4A98-B1CF-4092-8881-A1E910747080}" type="datetimeFigureOut">
               <a:rPr lang="ko-KR" altLang="en-US" smtClean="0"/>
-              <a:t>2020-06-03</a:t>
+              <a:t>2020-06-11</a:t>
             </a:fld>
             <a:endParaRPr lang="ko-KR" altLang="en-US"/>
           </a:p>
@@ -2512,7 +2518,7 @@
           <a:p>
             <a:fld id="{62CE4A98-B1CF-4092-8881-A1E910747080}" type="datetimeFigureOut">
               <a:rPr lang="ko-KR" altLang="en-US" smtClean="0"/>
-              <a:t>2020-06-03</a:t>
+              <a:t>2020-06-11</a:t>
             </a:fld>
             <a:endParaRPr lang="ko-KR" altLang="en-US"/>
           </a:p>
@@ -2725,7 +2731,7 @@
           <a:p>
             <a:fld id="{62CE4A98-B1CF-4092-8881-A1E910747080}" type="datetimeFigureOut">
               <a:rPr lang="ko-KR" altLang="en-US" smtClean="0"/>
-              <a:t>2020-06-03</a:t>
+              <a:t>2020-06-11</a:t>
             </a:fld>
             <a:endParaRPr lang="ko-KR" altLang="en-US"/>
           </a:p>
@@ -3102,6 +3108,1513 @@
       </p:grpSpPr>
       <p:sp>
         <p:nvSpPr>
+          <p:cNvPr id="2" name="제목 1"/>
+          <p:cNvSpPr>
+            <a:spLocks noGrp="1"/>
+          </p:cNvSpPr>
+          <p:nvPr>
+            <p:ph type="title"/>
+          </p:nvPr>
+        </p:nvSpPr>
+        <p:spPr/>
+        <p:txBody>
+          <a:bodyPr/>
+          <a:lstStyle/>
+          <a:p>
+            <a:r>
+              <a:rPr lang="en-US" altLang="ko-KR" dirty="0" smtClean="0"/>
+              <a:t>Weekly Report #1</a:t>
+            </a:r>
+            <a:endParaRPr lang="ko-KR" altLang="en-US" dirty="0"/>
+          </a:p>
+        </p:txBody>
+      </p:sp>
+    </p:spTree>
+    <p:extLst>
+      <p:ext uri="{BB962C8B-B14F-4D97-AF65-F5344CB8AC3E}">
+        <p14:creationId xmlns:p14="http://schemas.microsoft.com/office/powerpoint/2010/main" val="1652972348"/>
+      </p:ext>
+    </p:extLst>
+  </p:cSld>
+  <p:clrMapOvr>
+    <a:masterClrMapping/>
+  </p:clrMapOvr>
+  <p:timing>
+    <p:tnLst>
+      <p:par>
+        <p:cTn id="1" dur="indefinite" restart="never" nodeType="tmRoot"/>
+      </p:par>
+    </p:tnLst>
+  </p:timing>
+</p:sld>
+</file>
+
+<file path=ppt/slides/slide10.xml><?xml version="1.0" encoding="utf-8"?>
+<p:sld xmlns:a="http://schemas.openxmlformats.org/drawingml/2006/main" xmlns:r="http://schemas.openxmlformats.org/officeDocument/2006/relationships" xmlns:p="http://schemas.openxmlformats.org/presentationml/2006/main">
+  <p:cSld>
+    <p:spTree>
+      <p:nvGrpSpPr>
+        <p:cNvPr id="1" name=""/>
+        <p:cNvGrpSpPr/>
+        <p:nvPr/>
+      </p:nvGrpSpPr>
+      <p:grpSpPr>
+        <a:xfrm>
+          <a:off x="0" y="0"/>
+          <a:ext cx="0" cy="0"/>
+          <a:chOff x="0" y="0"/>
+          <a:chExt cx="0" cy="0"/>
+        </a:xfrm>
+      </p:grpSpPr>
+      <p:sp>
+        <p:nvSpPr>
+          <p:cNvPr id="8" name="TextBox 7"/>
+          <p:cNvSpPr txBox="1"/>
+          <p:nvPr/>
+        </p:nvSpPr>
+        <p:spPr>
+          <a:xfrm>
+            <a:off x="107504" y="188640"/>
+            <a:ext cx="8811130" cy="3416320"/>
+          </a:xfrm>
+          <a:prstGeom prst="rect">
+            <a:avLst/>
+          </a:prstGeom>
+          <a:noFill/>
+        </p:spPr>
+        <p:txBody>
+          <a:bodyPr wrap="none" rtlCol="0">
+            <a:spAutoFit/>
+          </a:bodyPr>
+          <a:lstStyle/>
+          <a:p>
+            <a:r>
+              <a:rPr lang="en-US" altLang="ko-KR" b="1" dirty="0" smtClean="0"/>
+              <a:t>Camera Calibration </a:t>
+            </a:r>
+            <a:r>
+              <a:rPr lang="ko-KR" altLang="en-US" b="1" dirty="0" smtClean="0"/>
+              <a:t>검증</a:t>
+            </a:r>
+            <a:endParaRPr lang="en-US" altLang="ko-KR" b="1" dirty="0" smtClean="0"/>
+          </a:p>
+          <a:p>
+            <a:endParaRPr lang="en-US" altLang="ko-KR" dirty="0"/>
+          </a:p>
+          <a:p>
+            <a:pPr marL="285750" indent="-285750">
+              <a:buFont typeface="Arial" pitchFamily="34" charset="0"/>
+              <a:buChar char="•"/>
+            </a:pPr>
+            <a:r>
+              <a:rPr lang="en-US" altLang="ko-KR" dirty="0" smtClean="0"/>
+              <a:t>Test Case </a:t>
+            </a:r>
+            <a:r>
+              <a:rPr lang="ko-KR" altLang="en-US" dirty="0" smtClean="0"/>
+              <a:t>마다 조금씩 다른 결과값을 보여줌</a:t>
+            </a:r>
+            <a:r>
+              <a:rPr lang="en-US" altLang="ko-KR" dirty="0" smtClean="0"/>
+              <a:t>.</a:t>
+            </a:r>
+          </a:p>
+          <a:p>
+            <a:pPr marL="285750" indent="-285750">
+              <a:buFont typeface="Arial" pitchFamily="34" charset="0"/>
+              <a:buChar char="•"/>
+            </a:pPr>
+            <a:endParaRPr lang="en-US" altLang="ko-KR" dirty="0" smtClean="0"/>
+          </a:p>
+          <a:p>
+            <a:pPr marL="285750" indent="-285750">
+              <a:buFont typeface="Arial" pitchFamily="34" charset="0"/>
+              <a:buChar char="•"/>
+            </a:pPr>
+            <a:r>
+              <a:rPr lang="en-US" altLang="ko-KR" dirty="0" smtClean="0"/>
+              <a:t>Chessboard</a:t>
+            </a:r>
+            <a:r>
+              <a:rPr lang="ko-KR" altLang="en-US" dirty="0" smtClean="0"/>
+              <a:t>가 아닌 </a:t>
+            </a:r>
+            <a:r>
+              <a:rPr lang="en-US" altLang="ko-KR" dirty="0" err="1" smtClean="0"/>
+              <a:t>Arucoboard</a:t>
+            </a:r>
+            <a:r>
+              <a:rPr lang="ko-KR" altLang="en-US" dirty="0" smtClean="0"/>
+              <a:t>를 사용해도 측정 시마다 상이한 값을 보여줌</a:t>
+            </a:r>
+            <a:r>
+              <a:rPr lang="en-US" altLang="ko-KR" dirty="0" smtClean="0"/>
+              <a:t>.</a:t>
+            </a:r>
+          </a:p>
+          <a:p>
+            <a:pPr marL="285750" indent="-285750">
+              <a:buFont typeface="Arial" pitchFamily="34" charset="0"/>
+              <a:buChar char="•"/>
+            </a:pPr>
+            <a:endParaRPr lang="en-US" altLang="ko-KR" dirty="0"/>
+          </a:p>
+          <a:p>
+            <a:pPr marL="285750" indent="-285750">
+              <a:buFont typeface="Arial" pitchFamily="34" charset="0"/>
+              <a:buChar char="•"/>
+            </a:pPr>
+            <a:r>
+              <a:rPr lang="en-US" altLang="ko-KR" dirty="0" smtClean="0"/>
+              <a:t>Camera Matrix</a:t>
+            </a:r>
+            <a:r>
+              <a:rPr lang="ko-KR" altLang="en-US" dirty="0" smtClean="0"/>
+              <a:t>의 값에 따라서 </a:t>
+            </a:r>
+            <a:r>
+              <a:rPr lang="en-US" altLang="ko-KR" dirty="0" err="1" smtClean="0"/>
+              <a:t>estimatePose</a:t>
+            </a:r>
+            <a:r>
+              <a:rPr lang="en-US" altLang="ko-KR" dirty="0" smtClean="0"/>
+              <a:t> </a:t>
+            </a:r>
+            <a:r>
+              <a:rPr lang="ko-KR" altLang="en-US" dirty="0" smtClean="0"/>
+              <a:t>함수에 의해서 측정되는 </a:t>
+            </a:r>
+            <a:r>
+              <a:rPr lang="en-US" altLang="ko-KR" dirty="0" err="1" smtClean="0"/>
+              <a:t>tvec</a:t>
+            </a:r>
+            <a:r>
+              <a:rPr lang="ko-KR" altLang="en-US" dirty="0" smtClean="0"/>
+              <a:t>과 </a:t>
+            </a:r>
+            <a:r>
+              <a:rPr lang="en-US" altLang="ko-KR" dirty="0" err="1" smtClean="0"/>
+              <a:t>rvec</a:t>
+            </a:r>
+            <a:endParaRPr lang="en-US" altLang="ko-KR" dirty="0" smtClean="0"/>
+          </a:p>
+          <a:p>
+            <a:r>
+              <a:rPr lang="ko-KR" altLang="en-US" dirty="0" smtClean="0"/>
+              <a:t>값이 달라짐</a:t>
+            </a:r>
+            <a:r>
+              <a:rPr lang="en-US" altLang="ko-KR" dirty="0" smtClean="0"/>
+              <a:t>. </a:t>
+            </a:r>
+            <a:r>
+              <a:rPr lang="en-US" altLang="ko-KR" dirty="0" smtClean="0">
+                <a:sym typeface="Wingdings" pitchFamily="2" charset="2"/>
+              </a:rPr>
+              <a:t> Hand Eye Calibration</a:t>
+            </a:r>
+            <a:r>
+              <a:rPr lang="ko-KR" altLang="en-US" dirty="0" smtClean="0">
+                <a:sym typeface="Wingdings" pitchFamily="2" charset="2"/>
+              </a:rPr>
+              <a:t>에 발생하는 </a:t>
+            </a:r>
+            <a:r>
+              <a:rPr lang="ko-KR" altLang="en-US" dirty="0" err="1" smtClean="0">
+                <a:sym typeface="Wingdings" pitchFamily="2" charset="2"/>
+              </a:rPr>
+              <a:t>오차값의</a:t>
+            </a:r>
+            <a:r>
+              <a:rPr lang="ko-KR" altLang="en-US" dirty="0" smtClean="0">
+                <a:sym typeface="Wingdings" pitchFamily="2" charset="2"/>
+              </a:rPr>
+              <a:t> 주요 원인이 될 것으로 </a:t>
+            </a:r>
+            <a:endParaRPr lang="en-US" altLang="ko-KR" dirty="0" smtClean="0">
+              <a:sym typeface="Wingdings" pitchFamily="2" charset="2"/>
+            </a:endParaRPr>
+          </a:p>
+          <a:p>
+            <a:r>
+              <a:rPr lang="ko-KR" altLang="en-US" dirty="0" smtClean="0">
+                <a:sym typeface="Wingdings" pitchFamily="2" charset="2"/>
+              </a:rPr>
+              <a:t>예상됨</a:t>
+            </a:r>
+            <a:r>
+              <a:rPr lang="en-US" altLang="ko-KR" dirty="0" smtClean="0">
+                <a:sym typeface="Wingdings" pitchFamily="2" charset="2"/>
+              </a:rPr>
+              <a:t>.</a:t>
+            </a:r>
+          </a:p>
+          <a:p>
+            <a:r>
+              <a:rPr lang="en-US" altLang="ko-KR" dirty="0" smtClean="0">
+                <a:sym typeface="Wingdings" pitchFamily="2" charset="2"/>
+              </a:rPr>
+              <a:t>(</a:t>
+            </a:r>
+            <a:r>
+              <a:rPr lang="ko-KR" altLang="en-US" dirty="0" smtClean="0">
+                <a:sym typeface="Wingdings" pitchFamily="2" charset="2"/>
+              </a:rPr>
+              <a:t>참고</a:t>
+            </a:r>
+            <a:r>
+              <a:rPr lang="en-US" altLang="ko-KR" dirty="0" smtClean="0">
+                <a:sym typeface="Wingdings" pitchFamily="2" charset="2"/>
+              </a:rPr>
+              <a:t>: </a:t>
+            </a:r>
+            <a:r>
+              <a:rPr lang="en-US" altLang="ko-KR" dirty="0">
+                <a:hlinkClick r:id="rId2"/>
+              </a:rPr>
+              <a:t>https://answers.opencv.org/question/216633/calibratehandeye-precision</a:t>
+            </a:r>
+            <a:r>
+              <a:rPr lang="en-US" altLang="ko-KR" dirty="0" smtClean="0">
+                <a:hlinkClick r:id="rId2"/>
+              </a:rPr>
+              <a:t>/</a:t>
+            </a:r>
+            <a:r>
+              <a:rPr lang="en-US" altLang="ko-KR" dirty="0" smtClean="0"/>
+              <a:t>)</a:t>
+            </a:r>
+          </a:p>
+          <a:p>
+            <a:endParaRPr lang="en-US" altLang="ko-KR" dirty="0">
+              <a:sym typeface="Wingdings" pitchFamily="2" charset="2"/>
+            </a:endParaRPr>
+          </a:p>
+          <a:p>
+            <a:pPr marL="285750" indent="-285750">
+              <a:buFont typeface="Arial" pitchFamily="34" charset="0"/>
+              <a:buChar char="•"/>
+            </a:pPr>
+            <a:r>
+              <a:rPr lang="ko-KR" altLang="en-US" dirty="0" smtClean="0">
+                <a:sym typeface="Wingdings" pitchFamily="2" charset="2"/>
+              </a:rPr>
+              <a:t>시험 데이터 참고</a:t>
+            </a:r>
+            <a:endParaRPr lang="en-US" altLang="ko-KR" dirty="0">
+              <a:sym typeface="Wingdings" pitchFamily="2" charset="2"/>
+            </a:endParaRPr>
+          </a:p>
+        </p:txBody>
+      </p:sp>
+    </p:spTree>
+    <p:extLst>
+      <p:ext uri="{BB962C8B-B14F-4D97-AF65-F5344CB8AC3E}">
+        <p14:creationId xmlns:p14="http://schemas.microsoft.com/office/powerpoint/2010/main" val="1513393356"/>
+      </p:ext>
+    </p:extLst>
+  </p:cSld>
+  <p:clrMapOvr>
+    <a:masterClrMapping/>
+  </p:clrMapOvr>
+  <p:timing>
+    <p:tnLst>
+      <p:par>
+        <p:cTn id="1" dur="indefinite" restart="never" nodeType="tmRoot"/>
+      </p:par>
+    </p:tnLst>
+  </p:timing>
+</p:sld>
+</file>
+
+<file path=ppt/slides/slide11.xml><?xml version="1.0" encoding="utf-8"?>
+<p:sld xmlns:a="http://schemas.openxmlformats.org/drawingml/2006/main" xmlns:r="http://schemas.openxmlformats.org/officeDocument/2006/relationships" xmlns:p="http://schemas.openxmlformats.org/presentationml/2006/main">
+  <p:cSld>
+    <p:spTree>
+      <p:nvGrpSpPr>
+        <p:cNvPr id="1" name=""/>
+        <p:cNvGrpSpPr/>
+        <p:nvPr/>
+      </p:nvGrpSpPr>
+      <p:grpSpPr>
+        <a:xfrm>
+          <a:off x="0" y="0"/>
+          <a:ext cx="0" cy="0"/>
+          <a:chOff x="0" y="0"/>
+          <a:chExt cx="0" cy="0"/>
+        </a:xfrm>
+      </p:grpSpPr>
+      <p:sp>
+        <p:nvSpPr>
+          <p:cNvPr id="8" name="TextBox 7"/>
+          <p:cNvSpPr txBox="1"/>
+          <p:nvPr/>
+        </p:nvSpPr>
+        <p:spPr>
+          <a:xfrm>
+            <a:off x="107504" y="188640"/>
+            <a:ext cx="3715761" cy="369332"/>
+          </a:xfrm>
+          <a:prstGeom prst="rect">
+            <a:avLst/>
+          </a:prstGeom>
+          <a:noFill/>
+        </p:spPr>
+        <p:txBody>
+          <a:bodyPr wrap="none" rtlCol="0">
+            <a:spAutoFit/>
+          </a:bodyPr>
+          <a:lstStyle/>
+          <a:p>
+            <a:r>
+              <a:rPr lang="en-US" altLang="ko-KR" b="1" dirty="0" err="1" smtClean="0"/>
+              <a:t>calibrateHandEye</a:t>
+            </a:r>
+            <a:r>
+              <a:rPr lang="en-US" altLang="ko-KR" b="1" dirty="0" smtClean="0"/>
+              <a:t> </a:t>
+            </a:r>
+            <a:r>
+              <a:rPr lang="ko-KR" altLang="en-US" b="1" dirty="0" smtClean="0"/>
+              <a:t>함수</a:t>
+            </a:r>
+            <a:r>
+              <a:rPr lang="en-US" altLang="ko-KR" b="1" dirty="0" smtClean="0"/>
+              <a:t> </a:t>
+            </a:r>
+            <a:r>
+              <a:rPr lang="ko-KR" altLang="en-US" b="1" dirty="0" smtClean="0"/>
+              <a:t>결과</a:t>
+            </a:r>
+            <a:r>
+              <a:rPr lang="en-US" altLang="ko-KR" b="1" dirty="0" smtClean="0"/>
+              <a:t> </a:t>
+            </a:r>
+            <a:r>
+              <a:rPr lang="ko-KR" altLang="en-US" b="1" dirty="0" smtClean="0"/>
+              <a:t>검증</a:t>
+            </a:r>
+            <a:endParaRPr lang="en-US" altLang="ko-KR" b="1" dirty="0" smtClean="0"/>
+          </a:p>
+        </p:txBody>
+      </p:sp>
+      <p:sp>
+        <p:nvSpPr>
+          <p:cNvPr id="2" name="직사각형 1"/>
+          <p:cNvSpPr/>
+          <p:nvPr/>
+        </p:nvSpPr>
+        <p:spPr>
+          <a:xfrm>
+            <a:off x="936104" y="575384"/>
+            <a:ext cx="4572000" cy="6093976"/>
+          </a:xfrm>
+          <a:prstGeom prst="rect">
+            <a:avLst/>
+          </a:prstGeom>
+        </p:spPr>
+        <p:txBody>
+          <a:bodyPr>
+            <a:spAutoFit/>
+          </a:bodyPr>
+          <a:lstStyle/>
+          <a:p>
+            <a:r>
+              <a:rPr lang="en-US" altLang="ko-KR" sz="1000" dirty="0"/>
+              <a:t>cv2.CALIB_HAND_EYE_TSAI</a:t>
+            </a:r>
+          </a:p>
+          <a:p>
+            <a:r>
+              <a:rPr lang="en-US" altLang="ko-KR" sz="1000" dirty="0"/>
+              <a:t>cv2.CALIB_HAND_EYE_PARK</a:t>
+            </a:r>
+          </a:p>
+          <a:p>
+            <a:r>
+              <a:rPr lang="en-US" altLang="ko-KR" sz="1000" dirty="0"/>
+              <a:t>cv2.CALIB_HAND_EYE_HORAUD</a:t>
+            </a:r>
+          </a:p>
+          <a:p>
+            <a:r>
+              <a:rPr lang="en-US" altLang="ko-KR" sz="1000" dirty="0"/>
+              <a:t>cv2.CALIB_HAND_EYE_ANDREFF</a:t>
+            </a:r>
+          </a:p>
+          <a:p>
+            <a:r>
+              <a:rPr lang="en-US" altLang="ko-KR" sz="1000" dirty="0"/>
+              <a:t>cv2.CALIB_HAND_EYE_DANIILIDIS</a:t>
+            </a:r>
+          </a:p>
+          <a:p>
+            <a:endParaRPr lang="en-US" altLang="ko-KR" sz="1000" dirty="0"/>
+          </a:p>
+          <a:p>
+            <a:r>
+              <a:rPr lang="en-US" altLang="ko-KR" sz="1000" dirty="0">
+                <a:solidFill>
+                  <a:schemeClr val="accent2">
+                    <a:lumMod val="75000"/>
+                  </a:schemeClr>
+                </a:solidFill>
+              </a:rPr>
+              <a:t>--------------------------------------</a:t>
+            </a:r>
+          </a:p>
+          <a:p>
+            <a:r>
+              <a:rPr lang="en-US" altLang="ko-KR" sz="1000" dirty="0">
+                <a:solidFill>
+                  <a:schemeClr val="accent2">
+                    <a:lumMod val="75000"/>
+                  </a:schemeClr>
+                </a:solidFill>
+              </a:rPr>
+              <a:t>Method 0</a:t>
+            </a:r>
+          </a:p>
+          <a:p>
+            <a:r>
+              <a:rPr lang="en-US" altLang="ko-KR" sz="1000" dirty="0">
+                <a:solidFill>
+                  <a:schemeClr val="accent2">
+                    <a:lumMod val="75000"/>
+                  </a:schemeClr>
+                </a:solidFill>
+              </a:rPr>
+              <a:t>[[-0.53111808 -0.66809495  0.5211168 ]</a:t>
+            </a:r>
+          </a:p>
+          <a:p>
+            <a:r>
+              <a:rPr lang="en-US" altLang="ko-KR" sz="1000" dirty="0">
+                <a:solidFill>
+                  <a:schemeClr val="accent2">
+                    <a:lumMod val="75000"/>
+                  </a:schemeClr>
+                </a:solidFill>
+              </a:rPr>
+              <a:t> [-0.67767341  0.7041279   0.212044  ]</a:t>
+            </a:r>
+          </a:p>
+          <a:p>
+            <a:r>
+              <a:rPr lang="en-US" altLang="ko-KR" sz="1000" dirty="0">
+                <a:solidFill>
+                  <a:schemeClr val="accent2">
+                    <a:lumMod val="75000"/>
+                  </a:schemeClr>
+                </a:solidFill>
+              </a:rPr>
+              <a:t> [-0.5085984  -0.2405266  -0.82672524]]</a:t>
+            </a:r>
+          </a:p>
+          <a:p>
+            <a:r>
+              <a:rPr lang="en-US" altLang="ko-KR" sz="1000" dirty="0">
+                <a:solidFill>
+                  <a:schemeClr val="accent2">
+                    <a:lumMod val="75000"/>
+                  </a:schemeClr>
+                </a:solidFill>
+              </a:rPr>
+              <a:t>[[-0.22988355]</a:t>
+            </a:r>
+          </a:p>
+          <a:p>
+            <a:r>
+              <a:rPr lang="en-US" altLang="ko-KR" sz="1000" dirty="0">
+                <a:solidFill>
+                  <a:schemeClr val="accent2">
+                    <a:lumMod val="75000"/>
+                  </a:schemeClr>
+                </a:solidFill>
+              </a:rPr>
+              <a:t> [-0.30189875]</a:t>
+            </a:r>
+          </a:p>
+          <a:p>
+            <a:r>
+              <a:rPr lang="en-US" altLang="ko-KR" sz="1000" dirty="0">
+                <a:solidFill>
+                  <a:schemeClr val="accent2">
+                    <a:lumMod val="75000"/>
+                  </a:schemeClr>
+                </a:solidFill>
+              </a:rPr>
+              <a:t> [ 0.01499742]]</a:t>
+            </a:r>
+          </a:p>
+          <a:p>
+            <a:r>
+              <a:rPr lang="en-US" altLang="ko-KR" sz="1000" dirty="0">
+                <a:solidFill>
+                  <a:schemeClr val="accent2">
+                    <a:lumMod val="75000"/>
+                  </a:schemeClr>
+                </a:solidFill>
+              </a:rPr>
+              <a:t>--------------------------------------</a:t>
+            </a:r>
+          </a:p>
+          <a:p>
+            <a:r>
+              <a:rPr lang="en-US" altLang="ko-KR" sz="1000" dirty="0">
+                <a:solidFill>
+                  <a:schemeClr val="accent2">
+                    <a:lumMod val="75000"/>
+                  </a:schemeClr>
+                </a:solidFill>
+              </a:rPr>
+              <a:t>Distance: 0.379755</a:t>
+            </a:r>
+          </a:p>
+          <a:p>
+            <a:r>
+              <a:rPr lang="en-US" altLang="ko-KR" sz="1000" dirty="0">
+                <a:solidFill>
+                  <a:schemeClr val="accent2">
+                    <a:lumMod val="75000"/>
+                  </a:schemeClr>
+                </a:solidFill>
+              </a:rPr>
+              <a:t>--------------------------------------</a:t>
+            </a:r>
+          </a:p>
+          <a:p>
+            <a:r>
+              <a:rPr lang="en-US" altLang="ko-KR" sz="1000" dirty="0"/>
+              <a:t>--------------------------------------</a:t>
+            </a:r>
+          </a:p>
+          <a:p>
+            <a:r>
+              <a:rPr lang="en-US" altLang="ko-KR" sz="1000" dirty="0"/>
+              <a:t>Method 1</a:t>
+            </a:r>
+          </a:p>
+          <a:p>
+            <a:r>
+              <a:rPr lang="en-US" altLang="ko-KR" sz="1000" dirty="0"/>
+              <a:t>[[-0.74201907 -0.66968512  0.03048841]</a:t>
+            </a:r>
+          </a:p>
+          <a:p>
+            <a:r>
+              <a:rPr lang="en-US" altLang="ko-KR" sz="1000" dirty="0"/>
+              <a:t> [-0.67034704  0.7416587  -0.02402535]</a:t>
+            </a:r>
+          </a:p>
+          <a:p>
+            <a:r>
+              <a:rPr lang="en-US" altLang="ko-KR" sz="1000" dirty="0"/>
+              <a:t> [-0.00652258 -0.03826508 -0.99924634]]</a:t>
+            </a:r>
+          </a:p>
+          <a:p>
+            <a:r>
+              <a:rPr lang="en-US" altLang="ko-KR" sz="1000" dirty="0"/>
+              <a:t>[[-0.032312  ]</a:t>
+            </a:r>
+          </a:p>
+          <a:p>
+            <a:r>
+              <a:rPr lang="en-US" altLang="ko-KR" sz="1000" dirty="0"/>
+              <a:t> [-0.13177883]</a:t>
+            </a:r>
+          </a:p>
+          <a:p>
+            <a:r>
+              <a:rPr lang="en-US" altLang="ko-KR" sz="1000" dirty="0"/>
+              <a:t> [ 0.00663744]]</a:t>
+            </a:r>
+          </a:p>
+          <a:p>
+            <a:r>
+              <a:rPr lang="en-US" altLang="ko-KR" sz="1000" dirty="0"/>
+              <a:t>--------------------------------------</a:t>
+            </a:r>
+          </a:p>
+          <a:p>
+            <a:r>
+              <a:rPr lang="en-US" altLang="ko-KR" sz="1000" dirty="0"/>
+              <a:t>Distance: 0.135845</a:t>
+            </a:r>
+          </a:p>
+          <a:p>
+            <a:r>
+              <a:rPr lang="en-US" altLang="ko-KR" sz="1000" dirty="0"/>
+              <a:t>--------------------------------------</a:t>
+            </a:r>
+          </a:p>
+          <a:p>
+            <a:r>
+              <a:rPr lang="en-US" altLang="ko-KR" sz="1000" b="1" dirty="0">
+                <a:solidFill>
+                  <a:srgbClr val="FF0000"/>
+                </a:solidFill>
+                <a:effectLst>
+                  <a:outerShdw blurRad="38100" dist="38100" dir="2700000" algn="tl">
+                    <a:srgbClr val="000000">
+                      <a:alpha val="43137"/>
+                    </a:srgbClr>
+                  </a:outerShdw>
+                </a:effectLst>
+              </a:rPr>
+              <a:t>--------------------------------------</a:t>
+            </a:r>
+          </a:p>
+          <a:p>
+            <a:r>
+              <a:rPr lang="en-US" altLang="ko-KR" sz="1000" b="1" dirty="0">
+                <a:solidFill>
+                  <a:srgbClr val="FF0000"/>
+                </a:solidFill>
+                <a:effectLst>
+                  <a:outerShdw blurRad="38100" dist="38100" dir="2700000" algn="tl">
+                    <a:srgbClr val="000000">
+                      <a:alpha val="43137"/>
+                    </a:srgbClr>
+                  </a:outerShdw>
+                </a:effectLst>
+              </a:rPr>
+              <a:t>Method 2</a:t>
+            </a:r>
+          </a:p>
+          <a:p>
+            <a:r>
+              <a:rPr lang="en-US" altLang="ko-KR" sz="1000" b="1" dirty="0">
+                <a:solidFill>
+                  <a:srgbClr val="FF0000"/>
+                </a:solidFill>
+                <a:effectLst>
+                  <a:outerShdw blurRad="38100" dist="38100" dir="2700000" algn="tl">
+                    <a:srgbClr val="000000">
+                      <a:alpha val="43137"/>
+                    </a:srgbClr>
+                  </a:outerShdw>
+                </a:effectLst>
+              </a:rPr>
+              <a:t>[[-0.74223362 -0.6694401   0.03064636]</a:t>
+            </a:r>
+          </a:p>
+          <a:p>
+            <a:r>
+              <a:rPr lang="en-US" altLang="ko-KR" sz="1000" b="1" dirty="0">
+                <a:solidFill>
+                  <a:srgbClr val="FF0000"/>
+                </a:solidFill>
+                <a:effectLst>
+                  <a:outerShdw blurRad="38100" dist="38100" dir="2700000" algn="tl">
+                    <a:srgbClr val="000000">
+                      <a:alpha val="43137"/>
+                    </a:srgbClr>
+                  </a:outerShdw>
+                </a:effectLst>
+              </a:rPr>
+              <a:t> [-0.67010743  0.74187888 -0.02391137]</a:t>
+            </a:r>
+          </a:p>
+          <a:p>
+            <a:r>
+              <a:rPr lang="en-US" altLang="ko-KR" sz="1000" b="1" dirty="0">
+                <a:solidFill>
+                  <a:srgbClr val="FF0000"/>
+                </a:solidFill>
+                <a:effectLst>
+                  <a:outerShdw blurRad="38100" dist="38100" dir="2700000" algn="tl">
+                    <a:srgbClr val="000000">
+                      <a:alpha val="43137"/>
+                    </a:srgbClr>
+                  </a:outerShdw>
+                </a:effectLst>
+              </a:rPr>
+              <a:t> [-0.00672865 -0.03828418 -0.99924424]]</a:t>
+            </a:r>
+          </a:p>
+          <a:p>
+            <a:r>
+              <a:rPr lang="en-US" altLang="ko-KR" sz="1000" b="1" dirty="0">
+                <a:solidFill>
+                  <a:srgbClr val="FF0000"/>
+                </a:solidFill>
+                <a:effectLst>
+                  <a:outerShdw blurRad="38100" dist="38100" dir="2700000" algn="tl">
+                    <a:srgbClr val="000000">
+                      <a:alpha val="43137"/>
+                    </a:srgbClr>
+                  </a:outerShdw>
+                </a:effectLst>
+              </a:rPr>
+              <a:t>[[-0.03235716]</a:t>
+            </a:r>
+          </a:p>
+          <a:p>
+            <a:r>
+              <a:rPr lang="en-US" altLang="ko-KR" sz="1000" b="1" dirty="0">
+                <a:solidFill>
+                  <a:srgbClr val="FF0000"/>
+                </a:solidFill>
+                <a:effectLst>
+                  <a:outerShdw blurRad="38100" dist="38100" dir="2700000" algn="tl">
+                    <a:srgbClr val="000000">
+                      <a:alpha val="43137"/>
+                    </a:srgbClr>
+                  </a:outerShdw>
+                </a:effectLst>
+              </a:rPr>
+              <a:t> [-0.13190149]</a:t>
+            </a:r>
+          </a:p>
+          <a:p>
+            <a:r>
+              <a:rPr lang="en-US" altLang="ko-KR" sz="1000" b="1" dirty="0">
+                <a:solidFill>
+                  <a:srgbClr val="FF0000"/>
+                </a:solidFill>
+                <a:effectLst>
+                  <a:outerShdw blurRad="38100" dist="38100" dir="2700000" algn="tl">
+                    <a:srgbClr val="000000">
+                      <a:alpha val="43137"/>
+                    </a:srgbClr>
+                  </a:outerShdw>
+                </a:effectLst>
+              </a:rPr>
+              <a:t> [ 0.00660721]]</a:t>
+            </a:r>
+          </a:p>
+          <a:p>
+            <a:r>
+              <a:rPr lang="en-US" altLang="ko-KR" sz="1000" b="1" dirty="0">
+                <a:solidFill>
+                  <a:srgbClr val="FF0000"/>
+                </a:solidFill>
+                <a:effectLst>
+                  <a:outerShdw blurRad="38100" dist="38100" dir="2700000" algn="tl">
+                    <a:srgbClr val="000000">
+                      <a:alpha val="43137"/>
+                    </a:srgbClr>
+                  </a:outerShdw>
+                </a:effectLst>
+              </a:rPr>
+              <a:t>--------------------------------------</a:t>
+            </a:r>
+          </a:p>
+          <a:p>
+            <a:r>
+              <a:rPr lang="en-US" altLang="ko-KR" sz="1000" b="1" dirty="0">
+                <a:solidFill>
+                  <a:srgbClr val="FF0000"/>
+                </a:solidFill>
+                <a:effectLst>
+                  <a:outerShdw blurRad="38100" dist="38100" dir="2700000" algn="tl">
+                    <a:srgbClr val="000000">
+                      <a:alpha val="43137"/>
+                    </a:srgbClr>
+                  </a:outerShdw>
+                </a:effectLst>
+              </a:rPr>
+              <a:t>Distance: 0.135973</a:t>
+            </a:r>
+          </a:p>
+          <a:p>
+            <a:r>
+              <a:rPr lang="en-US" altLang="ko-KR" sz="1000" b="1" dirty="0" smtClean="0">
+                <a:solidFill>
+                  <a:srgbClr val="FF0000"/>
+                </a:solidFill>
+                <a:effectLst>
+                  <a:outerShdw blurRad="38100" dist="38100" dir="2700000" algn="tl">
+                    <a:srgbClr val="000000">
+                      <a:alpha val="43137"/>
+                    </a:srgbClr>
+                  </a:outerShdw>
+                </a:effectLst>
+              </a:rPr>
+              <a:t>--------------------------------------</a:t>
+            </a:r>
+            <a:endParaRPr lang="en-US" altLang="ko-KR" sz="1000" b="1" dirty="0">
+              <a:solidFill>
+                <a:srgbClr val="FF0000"/>
+              </a:solidFill>
+              <a:effectLst>
+                <a:outerShdw blurRad="38100" dist="38100" dir="2700000" algn="tl">
+                  <a:srgbClr val="000000">
+                    <a:alpha val="43137"/>
+                  </a:srgbClr>
+                </a:outerShdw>
+              </a:effectLst>
+            </a:endParaRPr>
+          </a:p>
+        </p:txBody>
+      </p:sp>
+      <p:sp>
+        <p:nvSpPr>
+          <p:cNvPr id="4" name="직사각형 3"/>
+          <p:cNvSpPr/>
+          <p:nvPr/>
+        </p:nvSpPr>
+        <p:spPr>
+          <a:xfrm>
+            <a:off x="4392488" y="188640"/>
+            <a:ext cx="4572000" cy="3477875"/>
+          </a:xfrm>
+          <a:prstGeom prst="rect">
+            <a:avLst/>
+          </a:prstGeom>
+        </p:spPr>
+        <p:txBody>
+          <a:bodyPr>
+            <a:spAutoFit/>
+          </a:bodyPr>
+          <a:lstStyle/>
+          <a:p>
+            <a:r>
+              <a:rPr lang="en-US" altLang="ko-KR" sz="1000" dirty="0" smtClean="0">
+                <a:solidFill>
+                  <a:schemeClr val="accent2">
+                    <a:lumMod val="75000"/>
+                  </a:schemeClr>
+                </a:solidFill>
+              </a:rPr>
+              <a:t>--------------------------------------</a:t>
+            </a:r>
+            <a:endParaRPr lang="en-US" altLang="ko-KR" sz="1000" dirty="0">
+              <a:solidFill>
+                <a:schemeClr val="accent2">
+                  <a:lumMod val="75000"/>
+                </a:schemeClr>
+              </a:solidFill>
+            </a:endParaRPr>
+          </a:p>
+          <a:p>
+            <a:r>
+              <a:rPr lang="en-US" altLang="ko-KR" sz="1000" dirty="0">
+                <a:solidFill>
+                  <a:schemeClr val="accent2">
+                    <a:lumMod val="75000"/>
+                  </a:schemeClr>
+                </a:solidFill>
+              </a:rPr>
+              <a:t>Method 3</a:t>
+            </a:r>
+          </a:p>
+          <a:p>
+            <a:r>
+              <a:rPr lang="en-US" altLang="ko-KR" sz="1000" dirty="0">
+                <a:solidFill>
+                  <a:schemeClr val="accent2">
+                    <a:lumMod val="75000"/>
+                  </a:schemeClr>
+                </a:solidFill>
+              </a:rPr>
+              <a:t>[[-0.75403104 -0.65672513  0.01221899]</a:t>
+            </a:r>
+          </a:p>
+          <a:p>
+            <a:r>
+              <a:rPr lang="en-US" altLang="ko-KR" sz="1000" dirty="0">
+                <a:solidFill>
+                  <a:schemeClr val="accent2">
+                    <a:lumMod val="75000"/>
+                  </a:schemeClr>
+                </a:solidFill>
+              </a:rPr>
+              <a:t> [-0.65669077  0.75333574 -0.03524907]</a:t>
+            </a:r>
+          </a:p>
+          <a:p>
+            <a:r>
+              <a:rPr lang="en-US" altLang="ko-KR" sz="1000" dirty="0">
+                <a:solidFill>
+                  <a:schemeClr val="accent2">
+                    <a:lumMod val="75000"/>
+                  </a:schemeClr>
+                </a:solidFill>
+              </a:rPr>
+              <a:t> [ 0.01394395 -0.03460299 -0.99930386]]</a:t>
+            </a:r>
+          </a:p>
+          <a:p>
+            <a:r>
+              <a:rPr lang="en-US" altLang="ko-KR" sz="1000" dirty="0">
+                <a:solidFill>
+                  <a:schemeClr val="accent2">
+                    <a:lumMod val="75000"/>
+                  </a:schemeClr>
+                </a:solidFill>
+              </a:rPr>
+              <a:t>[[-0.1073896 ]</a:t>
+            </a:r>
+          </a:p>
+          <a:p>
+            <a:r>
+              <a:rPr lang="en-US" altLang="ko-KR" sz="1000" dirty="0">
+                <a:solidFill>
+                  <a:schemeClr val="accent2">
+                    <a:lumMod val="75000"/>
+                  </a:schemeClr>
+                </a:solidFill>
+              </a:rPr>
+              <a:t> [-0.01718936]</a:t>
+            </a:r>
+          </a:p>
+          <a:p>
+            <a:r>
+              <a:rPr lang="en-US" altLang="ko-KR" sz="1000" dirty="0">
+                <a:solidFill>
+                  <a:schemeClr val="accent2">
+                    <a:lumMod val="75000"/>
+                  </a:schemeClr>
+                </a:solidFill>
+              </a:rPr>
+              <a:t> [-0.23714391]]</a:t>
+            </a:r>
+          </a:p>
+          <a:p>
+            <a:r>
+              <a:rPr lang="en-US" altLang="ko-KR" sz="1000" dirty="0">
+                <a:solidFill>
+                  <a:schemeClr val="accent2">
+                    <a:lumMod val="75000"/>
+                  </a:schemeClr>
+                </a:solidFill>
+              </a:rPr>
+              <a:t>--------------------------------------</a:t>
+            </a:r>
+          </a:p>
+          <a:p>
+            <a:r>
+              <a:rPr lang="en-US" altLang="ko-KR" sz="1000" dirty="0">
+                <a:solidFill>
+                  <a:schemeClr val="accent2">
+                    <a:lumMod val="75000"/>
+                  </a:schemeClr>
+                </a:solidFill>
+              </a:rPr>
+              <a:t>Distance: 0.260893</a:t>
+            </a:r>
+          </a:p>
+          <a:p>
+            <a:r>
+              <a:rPr lang="en-US" altLang="ko-KR" sz="1000" dirty="0">
+                <a:solidFill>
+                  <a:schemeClr val="accent2">
+                    <a:lumMod val="75000"/>
+                  </a:schemeClr>
+                </a:solidFill>
+              </a:rPr>
+              <a:t>--------------------------------------</a:t>
+            </a:r>
+          </a:p>
+          <a:p>
+            <a:r>
+              <a:rPr lang="en-US" altLang="ko-KR" sz="1000" dirty="0"/>
+              <a:t>--------------------------------------</a:t>
+            </a:r>
+          </a:p>
+          <a:p>
+            <a:r>
+              <a:rPr lang="en-US" altLang="ko-KR" sz="1000" dirty="0"/>
+              <a:t>Method 4</a:t>
+            </a:r>
+          </a:p>
+          <a:p>
+            <a:r>
+              <a:rPr lang="en-US" altLang="ko-KR" sz="1000" dirty="0"/>
+              <a:t>[[-0.73287686 -0.67946701  0.03487258]</a:t>
+            </a:r>
+          </a:p>
+          <a:p>
+            <a:r>
+              <a:rPr lang="en-US" altLang="ko-KR" sz="1000" dirty="0"/>
+              <a:t> [-0.68030057  0.73253307 -0.02421645]</a:t>
+            </a:r>
+          </a:p>
+          <a:p>
+            <a:r>
+              <a:rPr lang="en-US" altLang="ko-KR" sz="1000" dirty="0"/>
+              <a:t> [-0.00909104 -0.04147152 -0.99909833]]</a:t>
+            </a:r>
+          </a:p>
+          <a:p>
+            <a:r>
+              <a:rPr lang="en-US" altLang="ko-KR" sz="1000" dirty="0"/>
+              <a:t>[[-0.0371705 ]</a:t>
+            </a:r>
+          </a:p>
+          <a:p>
+            <a:r>
+              <a:rPr lang="en-US" altLang="ko-KR" sz="1000" dirty="0"/>
+              <a:t> [-0.13063565]</a:t>
+            </a:r>
+          </a:p>
+          <a:p>
+            <a:r>
+              <a:rPr lang="en-US" altLang="ko-KR" sz="1000" dirty="0"/>
+              <a:t> [ 0.00827459]]</a:t>
+            </a:r>
+          </a:p>
+          <a:p>
+            <a:r>
+              <a:rPr lang="en-US" altLang="ko-KR" sz="1000" dirty="0"/>
+              <a:t>--------------------------------------</a:t>
+            </a:r>
+          </a:p>
+          <a:p>
+            <a:r>
+              <a:rPr lang="en-US" altLang="ko-KR" sz="1000" dirty="0"/>
+              <a:t>Distance: 0.136073</a:t>
+            </a:r>
+          </a:p>
+          <a:p>
+            <a:r>
+              <a:rPr lang="en-US" altLang="ko-KR" sz="1000" dirty="0" smtClean="0"/>
+              <a:t>--------------------------------------</a:t>
+            </a:r>
+            <a:endParaRPr lang="en-US" altLang="ko-KR" sz="1000" dirty="0"/>
+          </a:p>
+        </p:txBody>
+      </p:sp>
+      <p:sp>
+        <p:nvSpPr>
+          <p:cNvPr id="5" name="사각형 설명선 4"/>
+          <p:cNvSpPr/>
+          <p:nvPr/>
+        </p:nvSpPr>
+        <p:spPr>
+          <a:xfrm>
+            <a:off x="4355976" y="4335544"/>
+            <a:ext cx="4536504" cy="1685744"/>
+          </a:xfrm>
+          <a:prstGeom prst="wedgeRectCallout">
+            <a:avLst>
+              <a:gd name="adj1" fmla="val -72301"/>
+              <a:gd name="adj2" fmla="val -60263"/>
+            </a:avLst>
+          </a:prstGeom>
+        </p:spPr>
+        <p:style>
+          <a:lnRef idx="1">
+            <a:schemeClr val="accent2"/>
+          </a:lnRef>
+          <a:fillRef idx="2">
+            <a:schemeClr val="accent2"/>
+          </a:fillRef>
+          <a:effectRef idx="1">
+            <a:schemeClr val="accent2"/>
+          </a:effectRef>
+          <a:fontRef idx="minor">
+            <a:schemeClr val="dk1"/>
+          </a:fontRef>
+        </p:style>
+        <p:txBody>
+          <a:bodyPr rtlCol="0" anchor="ctr"/>
+          <a:lstStyle/>
+          <a:p>
+            <a:pPr marL="228600" indent="-228600">
+              <a:buAutoNum type="arabicPeriod"/>
+            </a:pPr>
+            <a:r>
+              <a:rPr lang="ko-KR" altLang="en-US" sz="1200" dirty="0" smtClean="0"/>
+              <a:t>동일한 시험 데이터를 이용해서 계산 결과 </a:t>
+            </a:r>
+            <a:r>
+              <a:rPr lang="en-US" altLang="ko-KR" sz="1200" dirty="0" smtClean="0"/>
+              <a:t>TSI</a:t>
+            </a:r>
+            <a:r>
+              <a:rPr lang="ko-KR" altLang="en-US" sz="1200" dirty="0" smtClean="0"/>
+              <a:t>와</a:t>
+            </a:r>
+            <a:r>
+              <a:rPr lang="en-US" altLang="ko-KR" sz="1200" dirty="0"/>
+              <a:t> </a:t>
+            </a:r>
+            <a:r>
+              <a:rPr lang="en-US" altLang="ko-KR" sz="1200" dirty="0" smtClean="0"/>
+              <a:t>ANDREFF</a:t>
+            </a:r>
+            <a:r>
+              <a:rPr lang="ko-KR" altLang="en-US" sz="1200" dirty="0" smtClean="0"/>
+              <a:t>의 방식의 경우 비정상인 </a:t>
+            </a:r>
+            <a:r>
+              <a:rPr lang="en-US" altLang="ko-KR" sz="1200" dirty="0" smtClean="0"/>
+              <a:t>matrix</a:t>
+            </a:r>
+            <a:r>
+              <a:rPr lang="ko-KR" altLang="en-US" sz="1200" dirty="0" smtClean="0"/>
+              <a:t>를 반환</a:t>
+            </a:r>
+            <a:r>
+              <a:rPr lang="en-US" altLang="ko-KR" sz="1200" dirty="0" smtClean="0"/>
+              <a:t>.</a:t>
+            </a:r>
+          </a:p>
+          <a:p>
+            <a:pPr marL="228600" indent="-228600">
+              <a:buAutoNum type="arabicPeriod"/>
+            </a:pPr>
+            <a:r>
+              <a:rPr lang="ko-KR" altLang="en-US" sz="1200" dirty="0" smtClean="0"/>
+              <a:t>현재는 </a:t>
+            </a:r>
+            <a:r>
+              <a:rPr lang="en-US" altLang="ko-KR" sz="1200" dirty="0" smtClean="0"/>
+              <a:t>Method 2(</a:t>
+            </a:r>
+            <a:r>
+              <a:rPr lang="en-US" altLang="ko-KR" sz="1200" dirty="0" err="1" smtClean="0"/>
+              <a:t>Horaud</a:t>
+            </a:r>
+            <a:r>
+              <a:rPr lang="en-US" altLang="ko-KR" sz="1200" dirty="0" smtClean="0"/>
+              <a:t> </a:t>
+            </a:r>
+            <a:r>
+              <a:rPr lang="ko-KR" altLang="en-US" sz="1200" dirty="0" smtClean="0"/>
+              <a:t>방식을 채용</a:t>
+            </a:r>
+            <a:r>
+              <a:rPr lang="en-US" altLang="ko-KR" sz="1200" dirty="0" smtClean="0"/>
+              <a:t>)</a:t>
+            </a:r>
+            <a:r>
+              <a:rPr lang="ko-KR" altLang="en-US" sz="1200" dirty="0" smtClean="0"/>
+              <a:t>를 통해서 검증 진행</a:t>
+            </a:r>
+            <a:endParaRPr lang="en-US" altLang="ko-KR" sz="1200" dirty="0" smtClean="0"/>
+          </a:p>
+          <a:p>
+            <a:pPr marL="228600" indent="-228600">
+              <a:buAutoNum type="arabicPeriod"/>
+            </a:pPr>
+            <a:r>
+              <a:rPr lang="en-US" altLang="ko-KR" sz="1200" dirty="0" smtClean="0"/>
+              <a:t>1</a:t>
+            </a:r>
+            <a:r>
+              <a:rPr lang="ko-KR" altLang="en-US" sz="1200" dirty="0" smtClean="0"/>
+              <a:t>번의 이슈가 </a:t>
+            </a:r>
+            <a:r>
+              <a:rPr lang="en-US" altLang="ko-KR" sz="1200" dirty="0" smtClean="0"/>
+              <a:t>Camera Matrix </a:t>
+            </a:r>
+            <a:r>
+              <a:rPr lang="ko-KR" altLang="en-US" sz="1200" dirty="0" smtClean="0"/>
+              <a:t>등의 다른 문제가 없는 지 검증 필요</a:t>
+            </a:r>
+            <a:r>
+              <a:rPr lang="en-US" altLang="ko-KR" sz="1200" dirty="0" smtClean="0"/>
+              <a:t>.</a:t>
+            </a:r>
+          </a:p>
+          <a:p>
+            <a:pPr marL="228600" indent="-228600">
+              <a:buAutoNum type="arabicPeriod"/>
+            </a:pPr>
+            <a:r>
+              <a:rPr lang="ko-KR" altLang="en-US" sz="1200" dirty="0" smtClean="0"/>
+              <a:t>시험 측정 샘플에 따라서 다른 값을 보이는 것으로 예상되며 최적의 샘플 측정 방법에 대한 고찰 필요</a:t>
+            </a:r>
+            <a:endParaRPr lang="en-US" altLang="ko-KR" sz="1200" dirty="0" smtClean="0"/>
+          </a:p>
+          <a:p>
+            <a:pPr marL="228600" indent="-228600">
+              <a:buAutoNum type="arabicPeriod"/>
+            </a:pPr>
+            <a:endParaRPr lang="en-US" altLang="ko-KR" sz="1200" dirty="0" smtClean="0"/>
+          </a:p>
+        </p:txBody>
+      </p:sp>
+    </p:spTree>
+    <p:extLst>
+      <p:ext uri="{BB962C8B-B14F-4D97-AF65-F5344CB8AC3E}">
+        <p14:creationId xmlns:p14="http://schemas.microsoft.com/office/powerpoint/2010/main" val="1863636930"/>
+      </p:ext>
+    </p:extLst>
+  </p:cSld>
+  <p:clrMapOvr>
+    <a:masterClrMapping/>
+  </p:clrMapOvr>
+  <p:timing>
+    <p:tnLst>
+      <p:par>
+        <p:cTn id="1" dur="indefinite" restart="never" nodeType="tmRoot"/>
+      </p:par>
+    </p:tnLst>
+  </p:timing>
+</p:sld>
+</file>
+
+<file path=ppt/slides/slide12.xml><?xml version="1.0" encoding="utf-8"?>
+<p:sld xmlns:a="http://schemas.openxmlformats.org/drawingml/2006/main" xmlns:r="http://schemas.openxmlformats.org/officeDocument/2006/relationships" xmlns:p="http://schemas.openxmlformats.org/presentationml/2006/main">
+  <p:cSld>
+    <p:spTree>
+      <p:nvGrpSpPr>
+        <p:cNvPr id="1" name=""/>
+        <p:cNvGrpSpPr/>
+        <p:nvPr/>
+      </p:nvGrpSpPr>
+      <p:grpSpPr>
+        <a:xfrm>
+          <a:off x="0" y="0"/>
+          <a:ext cx="0" cy="0"/>
+          <a:chOff x="0" y="0"/>
+          <a:chExt cx="0" cy="0"/>
+        </a:xfrm>
+      </p:grpSpPr>
+      <p:sp>
+        <p:nvSpPr>
+          <p:cNvPr id="8" name="TextBox 7"/>
+          <p:cNvSpPr txBox="1"/>
+          <p:nvPr/>
+        </p:nvSpPr>
+        <p:spPr>
+          <a:xfrm>
+            <a:off x="107504" y="188640"/>
+            <a:ext cx="8784976" cy="5078313"/>
+          </a:xfrm>
+          <a:prstGeom prst="rect">
+            <a:avLst/>
+          </a:prstGeom>
+          <a:noFill/>
+        </p:spPr>
+        <p:txBody>
+          <a:bodyPr wrap="square" rtlCol="0">
+            <a:spAutoFit/>
+          </a:bodyPr>
+          <a:lstStyle/>
+          <a:p>
+            <a:r>
+              <a:rPr lang="en-US" altLang="ko-KR" dirty="0" smtClean="0"/>
+              <a:t>TODO List</a:t>
+            </a:r>
+          </a:p>
+          <a:p>
+            <a:endParaRPr lang="en-US" altLang="ko-KR" dirty="0"/>
+          </a:p>
+          <a:p>
+            <a:pPr marL="285750" indent="-285750">
+              <a:buFont typeface="Arial" pitchFamily="34" charset="0"/>
+              <a:buChar char="•"/>
+            </a:pPr>
+            <a:r>
+              <a:rPr lang="ko-KR" altLang="en-US" dirty="0" smtClean="0"/>
+              <a:t>측정 침을 이용한 정확도 측정 및 시험 결과 도출</a:t>
+            </a:r>
+            <a:endParaRPr lang="en-US" altLang="ko-KR" dirty="0" smtClean="0"/>
+          </a:p>
+          <a:p>
+            <a:pPr marL="285750" indent="-285750">
+              <a:buFont typeface="Arial" pitchFamily="34" charset="0"/>
+              <a:buChar char="•"/>
+            </a:pPr>
+            <a:endParaRPr lang="en-US" altLang="ko-KR" dirty="0"/>
+          </a:p>
+          <a:p>
+            <a:pPr marL="285750" indent="-285750">
+              <a:buFont typeface="Arial" pitchFamily="34" charset="0"/>
+              <a:buChar char="•"/>
+            </a:pPr>
+            <a:endParaRPr lang="en-US" altLang="ko-KR" dirty="0" smtClean="0"/>
+          </a:p>
+          <a:p>
+            <a:pPr marL="285750" indent="-285750">
+              <a:buFont typeface="Arial" pitchFamily="34" charset="0"/>
+              <a:buChar char="•"/>
+            </a:pPr>
+            <a:r>
+              <a:rPr lang="en-US" altLang="ko-KR" dirty="0" smtClean="0"/>
+              <a:t>Robot</a:t>
+            </a:r>
+            <a:r>
+              <a:rPr lang="ko-KR" altLang="en-US" dirty="0" smtClean="0"/>
+              <a:t> </a:t>
+            </a:r>
+            <a:r>
+              <a:rPr lang="en-US" altLang="ko-KR" dirty="0" smtClean="0"/>
+              <a:t>XYZUVW</a:t>
+            </a:r>
+            <a:r>
+              <a:rPr lang="ko-KR" altLang="en-US" dirty="0" smtClean="0"/>
+              <a:t>에 대한 움직임에 대한 특이점 여부 등의 사전 유효성 검사 방법</a:t>
+            </a:r>
+            <a:endParaRPr lang="en-US" altLang="ko-KR" dirty="0" smtClean="0"/>
+          </a:p>
+          <a:p>
+            <a:r>
+              <a:rPr lang="en-US" altLang="ko-KR" dirty="0" smtClean="0"/>
+              <a:t> (</a:t>
+            </a:r>
+            <a:r>
+              <a:rPr lang="ko-KR" altLang="en-US" dirty="0" smtClean="0"/>
+              <a:t>문의 </a:t>
+            </a:r>
+            <a:r>
+              <a:rPr lang="ko-KR" altLang="en-US" dirty="0" err="1" smtClean="0"/>
+              <a:t>진행중</a:t>
+            </a:r>
+            <a:r>
+              <a:rPr lang="en-US" altLang="ko-KR" dirty="0" smtClean="0"/>
+              <a:t>): </a:t>
+            </a:r>
+            <a:r>
+              <a:rPr lang="en-US" altLang="ko-KR" dirty="0">
+                <a:hlinkClick r:id="rId2"/>
+              </a:rPr>
+              <a:t>http://forum.neuromeka.com/topic/51/indydcp-task_move_to-%ED%95%A8%EC%88%98-%EC%82%AC%EC%9A%A9-%EA%B4%80%EB%A0%A8-%EB%AC%B8%EC%9D%98</a:t>
+            </a:r>
+            <a:endParaRPr lang="en-US" altLang="ko-KR" dirty="0" smtClean="0"/>
+          </a:p>
+          <a:p>
+            <a:r>
+              <a:rPr lang="en-US" altLang="ko-KR" dirty="0" smtClean="0"/>
+              <a:t> </a:t>
+            </a:r>
+            <a:r>
+              <a:rPr lang="en-US" altLang="ko-KR" dirty="0" smtClean="0">
+                <a:sym typeface="Wingdings" pitchFamily="2" charset="2"/>
+              </a:rPr>
+              <a:t> </a:t>
+            </a:r>
+            <a:r>
+              <a:rPr lang="en-US" altLang="ko-KR" dirty="0" smtClean="0"/>
+              <a:t>Linux ROS </a:t>
+            </a:r>
+            <a:r>
+              <a:rPr lang="ko-KR" altLang="en-US" dirty="0" smtClean="0"/>
+              <a:t>환경 구축</a:t>
+            </a:r>
+            <a:r>
+              <a:rPr lang="en-US" altLang="ko-KR" dirty="0" smtClean="0"/>
+              <a:t>(</a:t>
+            </a:r>
+            <a:r>
+              <a:rPr lang="ko-KR" altLang="en-US" dirty="0" smtClean="0"/>
+              <a:t>필요성</a:t>
+            </a:r>
+            <a:r>
+              <a:rPr lang="en-US" altLang="ko-KR" dirty="0" smtClean="0"/>
+              <a:t>?)</a:t>
+            </a:r>
+          </a:p>
+          <a:p>
+            <a:endParaRPr lang="en-US" altLang="ko-KR" dirty="0" smtClean="0"/>
+          </a:p>
+          <a:p>
+            <a:endParaRPr lang="en-US" altLang="ko-KR" dirty="0"/>
+          </a:p>
+          <a:p>
+            <a:pPr marL="285750" indent="-285750">
+              <a:buFont typeface="Arial" pitchFamily="34" charset="0"/>
+              <a:buChar char="•"/>
+            </a:pPr>
+            <a:r>
+              <a:rPr lang="en-US" altLang="ko-KR" dirty="0" err="1" smtClean="0"/>
+              <a:t>Cognex</a:t>
+            </a:r>
+            <a:r>
+              <a:rPr lang="en-US" altLang="ko-KR" dirty="0" smtClean="0"/>
+              <a:t> </a:t>
+            </a:r>
+            <a:r>
+              <a:rPr lang="ko-KR" altLang="en-US" dirty="0" smtClean="0"/>
+              <a:t>카메라 관련 기능 검증 및 현재 진행 중인 정확도 측정에 </a:t>
+            </a:r>
+            <a:r>
+              <a:rPr lang="ko-KR" altLang="en-US" dirty="0" err="1" smtClean="0"/>
+              <a:t>비교군으로</a:t>
+            </a:r>
+            <a:r>
+              <a:rPr lang="ko-KR" altLang="en-US" dirty="0" smtClean="0"/>
+              <a:t> </a:t>
+            </a:r>
+            <a:endParaRPr lang="en-US" altLang="ko-KR" dirty="0" smtClean="0"/>
+          </a:p>
+          <a:p>
+            <a:r>
+              <a:rPr lang="ko-KR" altLang="en-US" dirty="0" smtClean="0"/>
+              <a:t>확인</a:t>
+            </a:r>
+            <a:r>
+              <a:rPr lang="en-US" altLang="ko-KR" dirty="0" smtClean="0"/>
+              <a:t>.</a:t>
+            </a:r>
+          </a:p>
+          <a:p>
+            <a:endParaRPr lang="en-US" altLang="ko-KR" dirty="0"/>
+          </a:p>
+          <a:p>
+            <a:pPr marL="285750" indent="-285750">
+              <a:buFont typeface="Arial" pitchFamily="34" charset="0"/>
+              <a:buChar char="•"/>
+            </a:pPr>
+            <a:r>
+              <a:rPr lang="en-US" altLang="ko-KR" dirty="0" err="1" smtClean="0"/>
+              <a:t>IndyDCP</a:t>
+            </a:r>
+            <a:r>
+              <a:rPr lang="en-US" altLang="ko-KR" dirty="0" smtClean="0"/>
+              <a:t> </a:t>
+            </a:r>
+            <a:r>
+              <a:rPr lang="ko-KR" altLang="en-US" dirty="0" smtClean="0"/>
+              <a:t>프로그램 기능을 활용한 자동화 방안</a:t>
+            </a:r>
+            <a:endParaRPr lang="en-US" altLang="ko-KR" dirty="0"/>
+          </a:p>
+          <a:p>
+            <a:endParaRPr lang="en-US" altLang="ko-KR" dirty="0" smtClean="0"/>
+          </a:p>
+          <a:p>
+            <a:endParaRPr lang="en-US" altLang="ko-KR" dirty="0" smtClean="0"/>
+          </a:p>
+        </p:txBody>
+      </p:sp>
+    </p:spTree>
+    <p:extLst>
+      <p:ext uri="{BB962C8B-B14F-4D97-AF65-F5344CB8AC3E}">
+        <p14:creationId xmlns:p14="http://schemas.microsoft.com/office/powerpoint/2010/main" val="2625520827"/>
+      </p:ext>
+    </p:extLst>
+  </p:cSld>
+  <p:clrMapOvr>
+    <a:masterClrMapping/>
+  </p:clrMapOvr>
+  <p:timing>
+    <p:tnLst>
+      <p:par>
+        <p:cTn id="1" dur="indefinite" restart="never" nodeType="tmRoot"/>
+      </p:par>
+    </p:tnLst>
+  </p:timing>
+</p:sld>
+</file>
+
+<file path=ppt/slides/slide2.xml><?xml version="1.0" encoding="utf-8"?>
+<p:sld xmlns:a="http://schemas.openxmlformats.org/drawingml/2006/main" xmlns:r="http://schemas.openxmlformats.org/officeDocument/2006/relationships" xmlns:p="http://schemas.openxmlformats.org/presentationml/2006/main">
+  <p:cSld>
+    <p:spTree>
+      <p:nvGrpSpPr>
+        <p:cNvPr id="1" name=""/>
+        <p:cNvGrpSpPr/>
+        <p:nvPr/>
+      </p:nvGrpSpPr>
+      <p:grpSpPr>
+        <a:xfrm>
+          <a:off x="0" y="0"/>
+          <a:ext cx="0" cy="0"/>
+          <a:chOff x="0" y="0"/>
+          <a:chExt cx="0" cy="0"/>
+        </a:xfrm>
+      </p:grpSpPr>
+      <p:sp>
+        <p:nvSpPr>
           <p:cNvPr id="4" name="TextBox 3"/>
           <p:cNvSpPr txBox="1"/>
           <p:nvPr/>
@@ -3124,23 +4637,11 @@
           <a:p>
             <a:r>
               <a:rPr lang="en-US" altLang="ko-KR" dirty="0" smtClean="0"/>
-              <a:t>#1 </a:t>
-            </a:r>
-            <a:r>
-              <a:rPr lang="en-US" altLang="ko-KR" dirty="0" smtClean="0"/>
-              <a:t>SVD</a:t>
+              <a:t>#1 SVD</a:t>
             </a:r>
             <a:r>
               <a:rPr lang="ko-KR" altLang="en-US" dirty="0" smtClean="0"/>
-              <a:t>를 </a:t>
-            </a:r>
-            <a:r>
-              <a:rPr lang="ko-KR" altLang="en-US" dirty="0" smtClean="0"/>
-              <a:t>이용한 변환 매트릭스 </a:t>
-            </a:r>
-            <a:r>
-              <a:rPr lang="ko-KR" altLang="en-US" dirty="0" smtClean="0"/>
-              <a:t> 획득</a:t>
+              <a:t>를 이용한 변환 매트릭스  획득</a:t>
             </a:r>
             <a:endParaRPr lang="ko-KR" altLang="en-US" dirty="0"/>
           </a:p>
@@ -3508,10 +5009,17 @@
   <p:clrMapOvr>
     <a:masterClrMapping/>
   </p:clrMapOvr>
+  <p:timing>
+    <p:tnLst>
+      <p:par>
+        <p:cTn id="1" dur="indefinite" restart="never" nodeType="tmRoot"/>
+      </p:par>
+    </p:tnLst>
+  </p:timing>
 </p:sld>
 </file>
 
-<file path=ppt/slides/slide2.xml><?xml version="1.0" encoding="utf-8"?>
+<file path=ppt/slides/slide3.xml><?xml version="1.0" encoding="utf-8"?>
 <p:sld xmlns:a="http://schemas.openxmlformats.org/drawingml/2006/main" xmlns:r="http://schemas.openxmlformats.org/officeDocument/2006/relationships" xmlns:p="http://schemas.openxmlformats.org/presentationml/2006/main">
   <p:cSld>
     <p:spTree>
@@ -3552,17 +5060,12 @@
           <a:p>
             <a:r>
               <a:rPr lang="en-US" altLang="ko-KR" dirty="0" smtClean="0"/>
-              <a:t>#1 </a:t>
-            </a:r>
-            <a:r>
-              <a:rPr lang="en-US" altLang="ko-KR" dirty="0" smtClean="0"/>
-              <a:t>SVD</a:t>
+              <a:t>#1 SVD</a:t>
             </a:r>
             <a:r>
               <a:rPr lang="ko-KR" altLang="en-US" dirty="0"/>
               <a:t>를 이용한 변환 매트릭스  획득</a:t>
             </a:r>
-            <a:endParaRPr lang="ko-KR" altLang="en-US" dirty="0"/>
           </a:p>
         </p:txBody>
       </p:sp>
@@ -3912,10 +5415,17 @@
   <p:clrMapOvr>
     <a:masterClrMapping/>
   </p:clrMapOvr>
+  <p:timing>
+    <p:tnLst>
+      <p:par>
+        <p:cTn id="1" dur="indefinite" restart="never" nodeType="tmRoot"/>
+      </p:par>
+    </p:tnLst>
+  </p:timing>
 </p:sld>
 </file>
 
-<file path=ppt/slides/slide3.xml><?xml version="1.0" encoding="utf-8"?>
+<file path=ppt/slides/slide4.xml><?xml version="1.0" encoding="utf-8"?>
 <p:sld xmlns:a="http://schemas.openxmlformats.org/drawingml/2006/main" xmlns:r="http://schemas.openxmlformats.org/officeDocument/2006/relationships" xmlns:p="http://schemas.openxmlformats.org/presentationml/2006/main">
   <p:cSld>
     <p:spTree>
@@ -4487,10 +5997,17 @@
   <p:clrMapOvr>
     <a:masterClrMapping/>
   </p:clrMapOvr>
+  <p:timing>
+    <p:tnLst>
+      <p:par>
+        <p:cTn id="1" dur="indefinite" restart="never" nodeType="tmRoot"/>
+      </p:par>
+    </p:tnLst>
+  </p:timing>
 </p:sld>
 </file>
 
-<file path=ppt/slides/slide4.xml><?xml version="1.0" encoding="utf-8"?>
+<file path=ppt/slides/slide5.xml><?xml version="1.0" encoding="utf-8"?>
 <p:sld xmlns:a="http://schemas.openxmlformats.org/drawingml/2006/main" xmlns:r="http://schemas.openxmlformats.org/officeDocument/2006/relationships" xmlns:p="http://schemas.openxmlformats.org/presentationml/2006/main">
   <p:cSld>
     <p:spTree>
@@ -5106,10 +6623,17 @@
   <p:clrMapOvr>
     <a:masterClrMapping/>
   </p:clrMapOvr>
+  <p:timing>
+    <p:tnLst>
+      <p:par>
+        <p:cTn id="1" dur="indefinite" restart="never" nodeType="tmRoot"/>
+      </p:par>
+    </p:tnLst>
+  </p:timing>
 </p:sld>
 </file>
 
-<file path=ppt/slides/slide5.xml><?xml version="1.0" encoding="utf-8"?>
+<file path=ppt/slides/slide6.xml><?xml version="1.0" encoding="utf-8"?>
 <p:sld xmlns:a="http://schemas.openxmlformats.org/drawingml/2006/main" xmlns:r="http://schemas.openxmlformats.org/officeDocument/2006/relationships" xmlns:p="http://schemas.openxmlformats.org/presentationml/2006/main">
   <p:cSld>
     <p:spTree>
@@ -6180,7 +7704,7 @@
           <a:p>
             <a:r>
               <a:rPr lang="en-US" altLang="ko-KR" sz="1100" dirty="0" err="1" smtClean="0"/>
-              <a:t>esitimatePoseSingleMaker</a:t>
+              <a:t>esitimatePoseSingleMarker</a:t>
             </a:r>
             <a:r>
               <a:rPr lang="en-US" altLang="ko-KR" sz="1100" dirty="0" smtClean="0"/>
@@ -6324,10 +7848,17 @@
   <p:clrMapOvr>
     <a:masterClrMapping/>
   </p:clrMapOvr>
+  <p:timing>
+    <p:tnLst>
+      <p:par>
+        <p:cTn id="1" dur="indefinite" restart="never" nodeType="tmRoot"/>
+      </p:par>
+    </p:tnLst>
+  </p:timing>
 </p:sld>
 </file>
 
-<file path=ppt/slides/slide6.xml><?xml version="1.0" encoding="utf-8"?>
+<file path=ppt/slides/slide7.xml><?xml version="1.0" encoding="utf-8"?>
 <p:sld xmlns:a="http://schemas.openxmlformats.org/drawingml/2006/main" xmlns:r="http://schemas.openxmlformats.org/officeDocument/2006/relationships" xmlns:p="http://schemas.openxmlformats.org/presentationml/2006/main">
   <p:cSld>
     <p:spTree>
@@ -6590,6 +8121,540 @@
   <p:clrMapOvr>
     <a:masterClrMapping/>
   </p:clrMapOvr>
+  <p:timing>
+    <p:tnLst>
+      <p:par>
+        <p:cTn id="1" dur="indefinite" restart="never" nodeType="tmRoot"/>
+      </p:par>
+    </p:tnLst>
+  </p:timing>
+</p:sld>
+</file>
+
+<file path=ppt/slides/slide8.xml><?xml version="1.0" encoding="utf-8"?>
+<p:sld xmlns:a="http://schemas.openxmlformats.org/drawingml/2006/main" xmlns:r="http://schemas.openxmlformats.org/officeDocument/2006/relationships" xmlns:p="http://schemas.openxmlformats.org/presentationml/2006/main">
+  <p:cSld>
+    <p:spTree>
+      <p:nvGrpSpPr>
+        <p:cNvPr id="1" name=""/>
+        <p:cNvGrpSpPr/>
+        <p:nvPr/>
+      </p:nvGrpSpPr>
+      <p:grpSpPr>
+        <a:xfrm>
+          <a:off x="0" y="0"/>
+          <a:ext cx="0" cy="0"/>
+          <a:chOff x="0" y="0"/>
+          <a:chExt cx="0" cy="0"/>
+        </a:xfrm>
+      </p:grpSpPr>
+      <p:sp>
+        <p:nvSpPr>
+          <p:cNvPr id="2" name="제목 1"/>
+          <p:cNvSpPr>
+            <a:spLocks noGrp="1"/>
+          </p:cNvSpPr>
+          <p:nvPr>
+            <p:ph type="title"/>
+          </p:nvPr>
+        </p:nvSpPr>
+        <p:spPr/>
+        <p:txBody>
+          <a:bodyPr/>
+          <a:lstStyle/>
+          <a:p>
+            <a:r>
+              <a:rPr lang="en-US" altLang="ko-KR" dirty="0" smtClean="0"/>
+              <a:t>Weekly Report #2</a:t>
+            </a:r>
+            <a:endParaRPr lang="ko-KR" altLang="en-US" dirty="0"/>
+          </a:p>
+        </p:txBody>
+      </p:sp>
+    </p:spTree>
+    <p:extLst>
+      <p:ext uri="{BB962C8B-B14F-4D97-AF65-F5344CB8AC3E}">
+        <p14:creationId xmlns:p14="http://schemas.microsoft.com/office/powerpoint/2010/main" val="908297922"/>
+      </p:ext>
+    </p:extLst>
+  </p:cSld>
+  <p:clrMapOvr>
+    <a:masterClrMapping/>
+  </p:clrMapOvr>
+  <p:timing>
+    <p:tnLst>
+      <p:par>
+        <p:cTn id="1" dur="indefinite" restart="never" nodeType="tmRoot"/>
+      </p:par>
+    </p:tnLst>
+  </p:timing>
+</p:sld>
+</file>
+
+<file path=ppt/slides/slide9.xml><?xml version="1.0" encoding="utf-8"?>
+<p:sld xmlns:a="http://schemas.openxmlformats.org/drawingml/2006/main" xmlns:r="http://schemas.openxmlformats.org/officeDocument/2006/relationships" xmlns:p="http://schemas.openxmlformats.org/presentationml/2006/main">
+  <p:cSld>
+    <p:spTree>
+      <p:nvGrpSpPr>
+        <p:cNvPr id="1" name=""/>
+        <p:cNvGrpSpPr/>
+        <p:nvPr/>
+      </p:nvGrpSpPr>
+      <p:grpSpPr>
+        <a:xfrm>
+          <a:off x="0" y="0"/>
+          <a:ext cx="0" cy="0"/>
+          <a:chOff x="0" y="0"/>
+          <a:chExt cx="0" cy="0"/>
+        </a:xfrm>
+      </p:grpSpPr>
+      <p:sp>
+        <p:nvSpPr>
+          <p:cNvPr id="8" name="TextBox 7"/>
+          <p:cNvSpPr txBox="1"/>
+          <p:nvPr/>
+        </p:nvSpPr>
+        <p:spPr>
+          <a:xfrm>
+            <a:off x="107504" y="188640"/>
+            <a:ext cx="4831323" cy="923330"/>
+          </a:xfrm>
+          <a:prstGeom prst="rect">
+            <a:avLst/>
+          </a:prstGeom>
+          <a:noFill/>
+        </p:spPr>
+        <p:txBody>
+          <a:bodyPr wrap="none" rtlCol="0">
+            <a:spAutoFit/>
+          </a:bodyPr>
+          <a:lstStyle/>
+          <a:p>
+            <a:r>
+              <a:rPr lang="en-US" altLang="ko-KR" b="1" dirty="0" smtClean="0"/>
+              <a:t>Input Values(Translation) </a:t>
+            </a:r>
+            <a:r>
+              <a:rPr lang="ko-KR" altLang="en-US" b="1" dirty="0" smtClean="0"/>
+              <a:t>검증</a:t>
+            </a:r>
+            <a:endParaRPr lang="en-US" altLang="ko-KR" b="1" dirty="0" smtClean="0"/>
+          </a:p>
+          <a:p>
+            <a:endParaRPr lang="en-US" altLang="ko-KR" dirty="0"/>
+          </a:p>
+          <a:p>
+            <a:r>
+              <a:rPr lang="ko-KR" altLang="en-US" dirty="0" smtClean="0"/>
+              <a:t>동일한 </a:t>
+            </a:r>
+            <a:r>
+              <a:rPr lang="en-US" altLang="ko-KR" dirty="0" smtClean="0"/>
+              <a:t>Marker Center </a:t>
+            </a:r>
+            <a:r>
+              <a:rPr lang="ko-KR" altLang="en-US" dirty="0" smtClean="0"/>
+              <a:t>위치를 </a:t>
+            </a:r>
+            <a:r>
+              <a:rPr lang="ko-KR" altLang="en-US" dirty="0" err="1" smtClean="0"/>
+              <a:t>타겟으로</a:t>
+            </a:r>
+            <a:r>
+              <a:rPr lang="ko-KR" altLang="en-US" dirty="0" smtClean="0"/>
+              <a:t> 측정</a:t>
+            </a:r>
+            <a:r>
+              <a:rPr lang="en-US" altLang="ko-KR" dirty="0" smtClean="0"/>
+              <a:t>.</a:t>
+            </a:r>
+          </a:p>
+        </p:txBody>
+      </p:sp>
+      <p:pic>
+        <p:nvPicPr>
+          <p:cNvPr id="1025" name="Picture 1"/>
+          <p:cNvPicPr>
+            <a:picLocks noChangeAspect="1" noChangeArrowheads="1"/>
+          </p:cNvPicPr>
+          <p:nvPr/>
+        </p:nvPicPr>
+        <p:blipFill>
+          <a:blip r:embed="rId2">
+            <a:extLst>
+              <a:ext uri="{28A0092B-C50C-407E-A947-70E740481C1C}">
+                <a14:useLocalDpi xmlns:a14="http://schemas.microsoft.com/office/drawing/2010/main" val="0"/>
+              </a:ext>
+            </a:extLst>
+          </a:blip>
+          <a:srcRect/>
+          <a:stretch>
+            <a:fillRect/>
+          </a:stretch>
+        </p:blipFill>
+        <p:spPr bwMode="auto">
+          <a:xfrm>
+            <a:off x="114618" y="1407989"/>
+            <a:ext cx="8921878" cy="2597075"/>
+          </a:xfrm>
+          <a:prstGeom prst="rect">
+            <a:avLst/>
+          </a:prstGeom>
+          <a:noFill/>
+          <a:ln>
+            <a:noFill/>
+          </a:ln>
+          <a:effectLst/>
+          <a:extLst>
+            <a:ext uri="{909E8E84-426E-40DD-AFC4-6F175D3DCCD1}">
+              <a14:hiddenFill xmlns:a14="http://schemas.microsoft.com/office/drawing/2010/main">
+                <a:solidFill>
+                  <a:schemeClr val="accent1"/>
+                </a:solidFill>
+              </a14:hiddenFill>
+            </a:ext>
+            <a:ext uri="{91240B29-F687-4F45-9708-019B960494DF}">
+              <a14:hiddenLine xmlns:a14="http://schemas.microsoft.com/office/drawing/2010/main" w="9525">
+                <a:solidFill>
+                  <a:schemeClr val="tx1"/>
+                </a:solidFill>
+                <a:miter lim="800000"/>
+                <a:headEnd/>
+                <a:tailEnd/>
+              </a14:hiddenLine>
+            </a:ext>
+            <a:ext uri="{AF507438-7753-43E0-B8FC-AC1667EBCBE1}">
+              <a14:hiddenEffects xmlns:a14="http://schemas.microsoft.com/office/drawing/2010/main">
+                <a:effectLst>
+                  <a:outerShdw dist="35921" dir="2700000" algn="ctr" rotWithShape="0">
+                    <a:schemeClr val="bg2"/>
+                  </a:outerShdw>
+                </a:effectLst>
+              </a14:hiddenEffects>
+            </a:ext>
+          </a:extLst>
+        </p:spPr>
+      </p:pic>
+      <p:sp>
+        <p:nvSpPr>
+          <p:cNvPr id="4" name="직사각형 3"/>
+          <p:cNvSpPr/>
+          <p:nvPr/>
+        </p:nvSpPr>
+        <p:spPr>
+          <a:xfrm>
+            <a:off x="3923928" y="1052736"/>
+            <a:ext cx="2664296" cy="3312368"/>
+          </a:xfrm>
+          <a:prstGeom prst="rect">
+            <a:avLst/>
+          </a:prstGeom>
+          <a:noFill/>
+          <a:ln>
+            <a:solidFill>
+              <a:srgbClr val="C00000"/>
+            </a:solidFill>
+          </a:ln>
+        </p:spPr>
+        <p:style>
+          <a:lnRef idx="2">
+            <a:schemeClr val="accent1">
+              <a:shade val="50000"/>
+            </a:schemeClr>
+          </a:lnRef>
+          <a:fillRef idx="1">
+            <a:schemeClr val="accent1"/>
+          </a:fillRef>
+          <a:effectRef idx="0">
+            <a:schemeClr val="accent1"/>
+          </a:effectRef>
+          <a:fontRef idx="minor">
+            <a:schemeClr val="lt1"/>
+          </a:fontRef>
+        </p:style>
+        <p:txBody>
+          <a:bodyPr rtlCol="0" anchor="ctr"/>
+          <a:lstStyle/>
+          <a:p>
+            <a:pPr algn="ctr"/>
+            <a:endParaRPr lang="ko-KR" altLang="en-US"/>
+          </a:p>
+        </p:txBody>
+      </p:sp>
+      <p:sp>
+        <p:nvSpPr>
+          <p:cNvPr id="7" name="사각형 설명선 6"/>
+          <p:cNvSpPr/>
+          <p:nvPr/>
+        </p:nvSpPr>
+        <p:spPr>
+          <a:xfrm>
+            <a:off x="179512" y="4365104"/>
+            <a:ext cx="3122116" cy="1584176"/>
+          </a:xfrm>
+          <a:prstGeom prst="wedgeRectCallout">
+            <a:avLst>
+              <a:gd name="adj1" fmla="val 6062"/>
+              <a:gd name="adj2" fmla="val -86864"/>
+            </a:avLst>
+          </a:prstGeom>
+        </p:spPr>
+        <p:style>
+          <a:lnRef idx="1">
+            <a:schemeClr val="accent3"/>
+          </a:lnRef>
+          <a:fillRef idx="2">
+            <a:schemeClr val="accent3"/>
+          </a:fillRef>
+          <a:effectRef idx="1">
+            <a:schemeClr val="accent3"/>
+          </a:effectRef>
+          <a:fontRef idx="minor">
+            <a:schemeClr val="dk1"/>
+          </a:fontRef>
+        </p:style>
+        <p:txBody>
+          <a:bodyPr rtlCol="0" anchor="ctr"/>
+          <a:lstStyle/>
+          <a:p>
+            <a:r>
+              <a:rPr lang="ko-KR" altLang="en-US" sz="1200" dirty="0" smtClean="0"/>
+              <a:t>고정된 </a:t>
+            </a:r>
+            <a:r>
+              <a:rPr lang="en-US" altLang="ko-KR" sz="1200" dirty="0" smtClean="0"/>
+              <a:t>Marker</a:t>
+            </a:r>
+            <a:r>
+              <a:rPr lang="ko-KR" altLang="en-US" sz="1200" dirty="0" smtClean="0"/>
+              <a:t>를 측정해도 </a:t>
+            </a:r>
+            <a:r>
+              <a:rPr lang="en-US" altLang="ko-KR" sz="1200" dirty="0" smtClean="0"/>
+              <a:t>xyz </a:t>
+            </a:r>
+            <a:r>
+              <a:rPr lang="ko-KR" altLang="en-US" sz="1200" dirty="0" smtClean="0"/>
+              <a:t>각각 </a:t>
+            </a:r>
+            <a:r>
+              <a:rPr lang="en-US" altLang="ko-KR" sz="1200" dirty="0" smtClean="0"/>
+              <a:t>0.7mm, 1.2mm, 0.4mm</a:t>
+            </a:r>
+            <a:r>
+              <a:rPr lang="ko-KR" altLang="en-US" sz="1200" dirty="0" smtClean="0"/>
+              <a:t>의 오차 측정</a:t>
+            </a:r>
+            <a:r>
+              <a:rPr lang="en-US" altLang="ko-KR" sz="1200" dirty="0" smtClean="0"/>
+              <a:t>.</a:t>
+            </a:r>
+          </a:p>
+          <a:p>
+            <a:endParaRPr lang="en-US" altLang="ko-KR" sz="1200" dirty="0"/>
+          </a:p>
+          <a:p>
+            <a:r>
+              <a:rPr lang="en-US" altLang="ko-KR" sz="1200" dirty="0" err="1" smtClean="0"/>
+              <a:t>Aruco</a:t>
+            </a:r>
+            <a:r>
+              <a:rPr lang="en-US" altLang="ko-KR" sz="1200" dirty="0" smtClean="0"/>
+              <a:t> Marker</a:t>
+            </a:r>
+            <a:r>
+              <a:rPr lang="ko-KR" altLang="en-US" sz="1200" dirty="0" smtClean="0"/>
+              <a:t>의 축이 고정될 경우에도 흔들리는 현상으로 인해서 발생되었을 것으로 예상됨</a:t>
+            </a:r>
+            <a:r>
+              <a:rPr lang="en-US" altLang="ko-KR" sz="1200" dirty="0" smtClean="0"/>
+              <a:t>.</a:t>
+            </a:r>
+          </a:p>
+        </p:txBody>
+      </p:sp>
+      <p:sp>
+        <p:nvSpPr>
+          <p:cNvPr id="10" name="사각형 설명선 9"/>
+          <p:cNvSpPr/>
+          <p:nvPr/>
+        </p:nvSpPr>
+        <p:spPr>
+          <a:xfrm>
+            <a:off x="3563888" y="4562656"/>
+            <a:ext cx="4536504" cy="1746663"/>
+          </a:xfrm>
+          <a:prstGeom prst="wedgeRectCallout">
+            <a:avLst>
+              <a:gd name="adj1" fmla="val -4552"/>
+              <a:gd name="adj2" fmla="val -65480"/>
+            </a:avLst>
+          </a:prstGeom>
+        </p:spPr>
+        <p:style>
+          <a:lnRef idx="1">
+            <a:schemeClr val="accent2"/>
+          </a:lnRef>
+          <a:fillRef idx="2">
+            <a:schemeClr val="accent2"/>
+          </a:fillRef>
+          <a:effectRef idx="1">
+            <a:schemeClr val="accent2"/>
+          </a:effectRef>
+          <a:fontRef idx="minor">
+            <a:schemeClr val="dk1"/>
+          </a:fontRef>
+        </p:style>
+        <p:txBody>
+          <a:bodyPr rtlCol="0" anchor="ctr"/>
+          <a:lstStyle/>
+          <a:p>
+            <a:r>
+              <a:rPr lang="en-US" altLang="ko-KR" sz="1200" dirty="0" smtClean="0"/>
+              <a:t>1. </a:t>
+            </a:r>
+            <a:r>
+              <a:rPr lang="ko-KR" altLang="en-US" sz="1200" dirty="0" smtClean="0"/>
+              <a:t>내부의 </a:t>
+            </a:r>
+            <a:r>
+              <a:rPr lang="en-US" altLang="ko-KR" sz="1200" dirty="0" smtClean="0"/>
+              <a:t>Camera Matrix</a:t>
+            </a:r>
+            <a:r>
+              <a:rPr lang="ko-KR" altLang="en-US" sz="1200" dirty="0" smtClean="0"/>
+              <a:t>를 사용하는 것이 체스보드 혹은 </a:t>
+            </a:r>
+            <a:r>
+              <a:rPr lang="en-US" altLang="ko-KR" sz="1200" dirty="0" err="1" smtClean="0"/>
+              <a:t>Aruco</a:t>
+            </a:r>
+            <a:r>
+              <a:rPr lang="en-US" altLang="ko-KR" sz="1200" dirty="0" smtClean="0"/>
+              <a:t> </a:t>
+            </a:r>
+            <a:r>
+              <a:rPr lang="ko-KR" altLang="en-US" sz="1200" dirty="0" smtClean="0"/>
+              <a:t>보드를 통해서 생성된 </a:t>
+            </a:r>
+            <a:r>
+              <a:rPr lang="en-US" altLang="ko-KR" sz="1200" dirty="0" smtClean="0"/>
+              <a:t>Camera Matrix </a:t>
+            </a:r>
+            <a:r>
+              <a:rPr lang="ko-KR" altLang="en-US" sz="1200" dirty="0" smtClean="0"/>
+              <a:t>보다 값의 편차도 적고 </a:t>
+            </a:r>
+            <a:r>
+              <a:rPr lang="en-US" altLang="ko-KR" sz="1200" dirty="0" smtClean="0"/>
+              <a:t>3D Depth</a:t>
+            </a:r>
+            <a:r>
+              <a:rPr lang="ko-KR" altLang="en-US" sz="1200" dirty="0" smtClean="0"/>
+              <a:t>에 의해 측정된 값에 근접함</a:t>
+            </a:r>
+            <a:r>
+              <a:rPr lang="en-US" altLang="ko-KR" sz="1200" dirty="0" smtClean="0"/>
+              <a:t>.</a:t>
+            </a:r>
+          </a:p>
+          <a:p>
+            <a:r>
+              <a:rPr lang="en-US" altLang="ko-KR" sz="1200" dirty="0" smtClean="0"/>
+              <a:t>(Translation</a:t>
+            </a:r>
+            <a:r>
+              <a:rPr lang="ko-KR" altLang="en-US" sz="1200" dirty="0" smtClean="0"/>
+              <a:t>은 </a:t>
+            </a:r>
+            <a:r>
+              <a:rPr lang="en-US" altLang="ko-KR" sz="1200" dirty="0" smtClean="0"/>
+              <a:t>SDK</a:t>
+            </a:r>
+            <a:r>
+              <a:rPr lang="ko-KR" altLang="en-US" sz="1200" dirty="0" smtClean="0"/>
+              <a:t>에 의해서 획득되는 </a:t>
+            </a:r>
+            <a:r>
+              <a:rPr lang="ko-KR" altLang="en-US" sz="1200" dirty="0" err="1" smtClean="0"/>
+              <a:t>좌표값을</a:t>
+            </a:r>
+            <a:r>
+              <a:rPr lang="ko-KR" altLang="en-US" sz="1200" dirty="0" smtClean="0"/>
+              <a:t> 사용하는 것이 유리 할 것으로 판단</a:t>
+            </a:r>
+            <a:r>
+              <a:rPr lang="en-US" altLang="ko-KR" sz="1200" dirty="0" smtClean="0"/>
+              <a:t>.)</a:t>
+            </a:r>
+          </a:p>
+          <a:p>
+            <a:endParaRPr lang="en-US" altLang="ko-KR" sz="1200" dirty="0"/>
+          </a:p>
+          <a:p>
+            <a:r>
+              <a:rPr lang="en-US" altLang="ko-KR" sz="1200" dirty="0" smtClean="0"/>
+              <a:t>2 Camera Calibration</a:t>
+            </a:r>
+            <a:r>
+              <a:rPr lang="ko-KR" altLang="en-US" sz="1200" dirty="0" smtClean="0"/>
+              <a:t>의 시험에 따라서 측정되는 결과값이 매번 상이</a:t>
+            </a:r>
+            <a:r>
+              <a:rPr lang="en-US" altLang="ko-KR" sz="1200" dirty="0" smtClean="0"/>
+              <a:t>. </a:t>
+            </a:r>
+            <a:r>
+              <a:rPr lang="en-US" altLang="ko-KR" sz="1200" dirty="0" smtClean="0">
+                <a:sym typeface="Wingdings" pitchFamily="2" charset="2"/>
+              </a:rPr>
+              <a:t> </a:t>
+            </a:r>
+            <a:r>
+              <a:rPr lang="ko-KR" altLang="en-US" sz="1200" dirty="0" smtClean="0">
+                <a:sym typeface="Wingdings" pitchFamily="2" charset="2"/>
+              </a:rPr>
+              <a:t>다음 </a:t>
+            </a:r>
+            <a:r>
+              <a:rPr lang="ko-KR" altLang="en-US" sz="1200" dirty="0" err="1" smtClean="0">
+                <a:sym typeface="Wingdings" pitchFamily="2" charset="2"/>
+              </a:rPr>
+              <a:t>장표</a:t>
+            </a:r>
+            <a:r>
+              <a:rPr lang="ko-KR" altLang="en-US" sz="1200" dirty="0" smtClean="0">
+                <a:sym typeface="Wingdings" pitchFamily="2" charset="2"/>
+              </a:rPr>
+              <a:t> 참조</a:t>
+            </a:r>
+            <a:r>
+              <a:rPr lang="en-US" altLang="ko-KR" sz="1200" dirty="0" smtClean="0">
+                <a:sym typeface="Wingdings" pitchFamily="2" charset="2"/>
+              </a:rPr>
+              <a:t>.</a:t>
+            </a:r>
+            <a:endParaRPr lang="en-US" altLang="ko-KR" sz="1200" dirty="0" smtClean="0"/>
+          </a:p>
+        </p:txBody>
+      </p:sp>
+    </p:spTree>
+    <p:extLst>
+      <p:ext uri="{BB962C8B-B14F-4D97-AF65-F5344CB8AC3E}">
+        <p14:creationId xmlns:p14="http://schemas.microsoft.com/office/powerpoint/2010/main" val="4096777899"/>
+      </p:ext>
+    </p:extLst>
+  </p:cSld>
+  <p:clrMapOvr>
+    <a:masterClrMapping/>
+  </p:clrMapOvr>
+  <p:timing>
+    <p:tnLst>
+      <p:par>
+        <p:cTn id="1" dur="indefinite" restart="never" nodeType="tmRoot"/>
+      </p:par>
+    </p:tnLst>
+  </p:timing>
 </p:sld>
 </file>
 

</xml_diff>